<commit_message>
[update] center_report.pptx (final update)
</commit_message>
<xml_diff>
--- a/presentation/center_report.pptx
+++ b/presentation/center_report.pptx
@@ -207,7 +207,7 @@
           <a:p>
             <a:fld id="{2DB3EFBE-5725-D447-9B92-70418B62CDD6}" type="datetimeFigureOut">
               <a:rPr lang="en-US" smtClean="0"/>
-              <a:t>10/28/17</a:t>
+              <a:t>10/30/17</a:t>
             </a:fld>
             <a:endParaRPr lang="en-US"/>
           </a:p>
@@ -475,6 +475,490 @@
 </p:notesMaster>
 </file>
 
+<file path=ppt/notesSlides/notesSlide1.xml><?xml version="1.0" encoding="utf-8"?>
+<p:notes xmlns:a="http://schemas.openxmlformats.org/drawingml/2006/main" xmlns:r="http://schemas.openxmlformats.org/officeDocument/2006/relationships" xmlns:p="http://schemas.openxmlformats.org/presentationml/2006/main">
+  <p:cSld>
+    <p:spTree>
+      <p:nvGrpSpPr>
+        <p:cNvPr id="1" name=""/>
+        <p:cNvGrpSpPr/>
+        <p:nvPr/>
+      </p:nvGrpSpPr>
+      <p:grpSpPr>
+        <a:xfrm>
+          <a:off x="0" y="0"/>
+          <a:ext cx="0" cy="0"/>
+          <a:chOff x="0" y="0"/>
+          <a:chExt cx="0" cy="0"/>
+        </a:xfrm>
+      </p:grpSpPr>
+      <p:sp>
+        <p:nvSpPr>
+          <p:cNvPr id="2" name="Slide Image Placeholder 1"/>
+          <p:cNvSpPr>
+            <a:spLocks noGrp="1" noRot="1" noChangeAspect="1"/>
+          </p:cNvSpPr>
+          <p:nvPr>
+            <p:ph type="sldImg"/>
+          </p:nvPr>
+        </p:nvSpPr>
+        <p:spPr/>
+      </p:sp>
+      <p:sp>
+        <p:nvSpPr>
+          <p:cNvPr id="3" name="Notes Placeholder 2"/>
+          <p:cNvSpPr>
+            <a:spLocks noGrp="1"/>
+          </p:cNvSpPr>
+          <p:nvPr>
+            <p:ph type="body" idx="1"/>
+          </p:nvPr>
+        </p:nvSpPr>
+        <p:spPr/>
+        <p:txBody>
+          <a:bodyPr/>
+          <a:lstStyle/>
+          <a:p>
+            <a:r>
+              <a:rPr lang="en-US" altLang="ja-JP"/>
+              <a:t>$title, </a:t>
+            </a:r>
+            <a:r>
+              <a:rPr lang="ja-JP" altLang="en-US"/>
+              <a:t>平山研の森下が発表させて頂きます</a:t>
+            </a:r>
+            <a:endParaRPr lang="en-US"/>
+          </a:p>
+        </p:txBody>
+      </p:sp>
+      <p:sp>
+        <p:nvSpPr>
+          <p:cNvPr id="4" name="Slide Number Placeholder 3"/>
+          <p:cNvSpPr>
+            <a:spLocks noGrp="1"/>
+          </p:cNvSpPr>
+          <p:nvPr>
+            <p:ph type="sldNum" sz="quarter" idx="10"/>
+          </p:nvPr>
+        </p:nvSpPr>
+        <p:spPr/>
+        <p:txBody>
+          <a:bodyPr/>
+          <a:lstStyle/>
+          <a:p>
+            <a:fld id="{61549E49-E5BF-D04D-AC87-92E43090F338}" type="slidenum">
+              <a:rPr lang="en-US" smtClean="0"/>
+              <a:t>1</a:t>
+            </a:fld>
+            <a:endParaRPr lang="en-US"/>
+          </a:p>
+        </p:txBody>
+      </p:sp>
+    </p:spTree>
+    <p:extLst>
+      <p:ext uri="{BB962C8B-B14F-4D97-AF65-F5344CB8AC3E}">
+        <p14:creationId xmlns:p14="http://schemas.microsoft.com/office/powerpoint/2010/main" val="24077743"/>
+      </p:ext>
+    </p:extLst>
+  </p:cSld>
+  <p:clrMapOvr>
+    <a:masterClrMapping/>
+  </p:clrMapOvr>
+</p:notes>
+</file>
+
+<file path=ppt/notesSlides/notesSlide2.xml><?xml version="1.0" encoding="utf-8"?>
+<p:notes xmlns:a="http://schemas.openxmlformats.org/drawingml/2006/main" xmlns:r="http://schemas.openxmlformats.org/officeDocument/2006/relationships" xmlns:p="http://schemas.openxmlformats.org/presentationml/2006/main">
+  <p:cSld>
+    <p:spTree>
+      <p:nvGrpSpPr>
+        <p:cNvPr id="1" name=""/>
+        <p:cNvGrpSpPr/>
+        <p:nvPr/>
+      </p:nvGrpSpPr>
+      <p:grpSpPr>
+        <a:xfrm>
+          <a:off x="0" y="0"/>
+          <a:ext cx="0" cy="0"/>
+          <a:chOff x="0" y="0"/>
+          <a:chExt cx="0" cy="0"/>
+        </a:xfrm>
+      </p:grpSpPr>
+      <p:sp>
+        <p:nvSpPr>
+          <p:cNvPr id="2" name="Slide Image Placeholder 1"/>
+          <p:cNvSpPr>
+            <a:spLocks noGrp="1" noRot="1" noChangeAspect="1"/>
+          </p:cNvSpPr>
+          <p:nvPr>
+            <p:ph type="sldImg"/>
+          </p:nvPr>
+        </p:nvSpPr>
+        <p:spPr/>
+      </p:sp>
+      <p:sp>
+        <p:nvSpPr>
+          <p:cNvPr id="3" name="Notes Placeholder 2"/>
+          <p:cNvSpPr>
+            <a:spLocks noGrp="1"/>
+          </p:cNvSpPr>
+          <p:nvPr>
+            <p:ph type="body" idx="1"/>
+          </p:nvPr>
+        </p:nvSpPr>
+        <p:spPr/>
+        <p:txBody>
+          <a:bodyPr/>
+          <a:lstStyle/>
+          <a:p>
+            <a:r>
+              <a:rPr lang="ja-JP" altLang="en-US"/>
+              <a:t>スポーツにおいて、コーチの体験のみに基づく指導だけでは不十分という問題があります。運動の感覚というのは個人差があるので必ずしもコーチの感覚が正しいとは限らないということです。そこで、客観的な指標として力学による解析があると練習指導に役立つのではないか、と考えました。客観的な指標というのは、例えば、</a:t>
+            </a:r>
+            <a:r>
+              <a:rPr lang="en-US" altLang="ja-JP"/>
+              <a:t>45</a:t>
+            </a:r>
+            <a:r>
+              <a:rPr lang="ja-JP" altLang="en-US"/>
+              <a:t>度で打ち出せば</a:t>
+            </a:r>
+            <a:r>
+              <a:rPr lang="en-US" altLang="ja-JP"/>
+              <a:t>5m</a:t>
+            </a:r>
+            <a:r>
+              <a:rPr lang="ja-JP" altLang="en-US"/>
+              <a:t>遠くに飛ぶ、といった具体的な数値のことです。シミュレーションによってその数値パラメータを決定して、最適動作推定に生かします。今回は球技スポーツに着目したのですが、球技スポーツでは球、ボールの特性が重要です。ボールの振る舞いを知ることはスポーツの技術向上にも直結するので、ボールの特性をシミュレーションで求めます。あくまで最適動作推定が最終目標ですが、第一段階としてボールの特性を調べます。そこで、今回は形状が比較的複雑で振る舞いが空気抵抗に大きく影響されるバドミントンのシャトルの特性を調べることにしました。</a:t>
+            </a:r>
+            <a:endParaRPr lang="en-US"/>
+          </a:p>
+        </p:txBody>
+      </p:sp>
+      <p:sp>
+        <p:nvSpPr>
+          <p:cNvPr id="4" name="Slide Number Placeholder 3"/>
+          <p:cNvSpPr>
+            <a:spLocks noGrp="1"/>
+          </p:cNvSpPr>
+          <p:nvPr>
+            <p:ph type="sldNum" sz="quarter" idx="10"/>
+          </p:nvPr>
+        </p:nvSpPr>
+        <p:spPr/>
+        <p:txBody>
+          <a:bodyPr/>
+          <a:lstStyle/>
+          <a:p>
+            <a:fld id="{61549E49-E5BF-D04D-AC87-92E43090F338}" type="slidenum">
+              <a:rPr lang="en-US" smtClean="0"/>
+              <a:t>2</a:t>
+            </a:fld>
+            <a:endParaRPr lang="en-US"/>
+          </a:p>
+        </p:txBody>
+      </p:sp>
+    </p:spTree>
+    <p:extLst>
+      <p:ext uri="{BB962C8B-B14F-4D97-AF65-F5344CB8AC3E}">
+        <p14:creationId xmlns:p14="http://schemas.microsoft.com/office/powerpoint/2010/main" val="1758443205"/>
+      </p:ext>
+    </p:extLst>
+  </p:cSld>
+  <p:clrMapOvr>
+    <a:masterClrMapping/>
+  </p:clrMapOvr>
+</p:notes>
+</file>
+
+<file path=ppt/notesSlides/notesSlide3.xml><?xml version="1.0" encoding="utf-8"?>
+<p:notes xmlns:a="http://schemas.openxmlformats.org/drawingml/2006/main" xmlns:r="http://schemas.openxmlformats.org/officeDocument/2006/relationships" xmlns:p="http://schemas.openxmlformats.org/presentationml/2006/main">
+  <p:cSld>
+    <p:spTree>
+      <p:nvGrpSpPr>
+        <p:cNvPr id="1" name=""/>
+        <p:cNvGrpSpPr/>
+        <p:nvPr/>
+      </p:nvGrpSpPr>
+      <p:grpSpPr>
+        <a:xfrm>
+          <a:off x="0" y="0"/>
+          <a:ext cx="0" cy="0"/>
+          <a:chOff x="0" y="0"/>
+          <a:chExt cx="0" cy="0"/>
+        </a:xfrm>
+      </p:grpSpPr>
+      <p:sp>
+        <p:nvSpPr>
+          <p:cNvPr id="2" name="Slide Image Placeholder 1"/>
+          <p:cNvSpPr>
+            <a:spLocks noGrp="1" noRot="1" noChangeAspect="1"/>
+          </p:cNvSpPr>
+          <p:nvPr>
+            <p:ph type="sldImg"/>
+          </p:nvPr>
+        </p:nvSpPr>
+        <p:spPr/>
+      </p:sp>
+      <p:sp>
+        <p:nvSpPr>
+          <p:cNvPr id="3" name="Notes Placeholder 2"/>
+          <p:cNvSpPr>
+            <a:spLocks noGrp="1"/>
+          </p:cNvSpPr>
+          <p:nvPr>
+            <p:ph type="body" idx="1"/>
+          </p:nvPr>
+        </p:nvSpPr>
+        <p:spPr/>
+        <p:txBody>
+          <a:bodyPr/>
+          <a:lstStyle/>
+          <a:p>
+            <a:r>
+              <a:rPr lang="ja-JP" altLang="en-US"/>
+              <a:t>研究目的は大きく分けて二つあります。画像処理による球の軌道検出手法の確立と、シミュレーションを用いた現実的な軌道を描く物理モデルの確立です。物理モデルは検出した軌道とシミュレーションの軌道を比較しつつ探すことになります。</a:t>
+            </a:r>
+            <a:endParaRPr lang="en-US"/>
+          </a:p>
+        </p:txBody>
+      </p:sp>
+      <p:sp>
+        <p:nvSpPr>
+          <p:cNvPr id="4" name="Slide Number Placeholder 3"/>
+          <p:cNvSpPr>
+            <a:spLocks noGrp="1"/>
+          </p:cNvSpPr>
+          <p:nvPr>
+            <p:ph type="sldNum" sz="quarter" idx="10"/>
+          </p:nvPr>
+        </p:nvSpPr>
+        <p:spPr/>
+        <p:txBody>
+          <a:bodyPr/>
+          <a:lstStyle/>
+          <a:p>
+            <a:fld id="{61549E49-E5BF-D04D-AC87-92E43090F338}" type="slidenum">
+              <a:rPr lang="en-US" smtClean="0"/>
+              <a:t>3</a:t>
+            </a:fld>
+            <a:endParaRPr lang="en-US"/>
+          </a:p>
+        </p:txBody>
+      </p:sp>
+    </p:spTree>
+    <p:extLst>
+      <p:ext uri="{BB962C8B-B14F-4D97-AF65-F5344CB8AC3E}">
+        <p14:creationId xmlns:p14="http://schemas.microsoft.com/office/powerpoint/2010/main" val="122678333"/>
+      </p:ext>
+    </p:extLst>
+  </p:cSld>
+  <p:clrMapOvr>
+    <a:masterClrMapping/>
+  </p:clrMapOvr>
+</p:notes>
+</file>
+
+<file path=ppt/notesSlides/notesSlide4.xml><?xml version="1.0" encoding="utf-8"?>
+<p:notes xmlns:a="http://schemas.openxmlformats.org/drawingml/2006/main" xmlns:r="http://schemas.openxmlformats.org/officeDocument/2006/relationships" xmlns:p="http://schemas.openxmlformats.org/presentationml/2006/main">
+  <p:cSld>
+    <p:spTree>
+      <p:nvGrpSpPr>
+        <p:cNvPr id="1" name=""/>
+        <p:cNvGrpSpPr/>
+        <p:nvPr/>
+      </p:nvGrpSpPr>
+      <p:grpSpPr>
+        <a:xfrm>
+          <a:off x="0" y="0"/>
+          <a:ext cx="0" cy="0"/>
+          <a:chOff x="0" y="0"/>
+          <a:chExt cx="0" cy="0"/>
+        </a:xfrm>
+      </p:grpSpPr>
+      <p:sp>
+        <p:nvSpPr>
+          <p:cNvPr id="2" name="Slide Image Placeholder 1"/>
+          <p:cNvSpPr>
+            <a:spLocks noGrp="1" noRot="1" noChangeAspect="1"/>
+          </p:cNvSpPr>
+          <p:nvPr>
+            <p:ph type="sldImg"/>
+          </p:nvPr>
+        </p:nvSpPr>
+        <p:spPr/>
+      </p:sp>
+      <p:sp>
+        <p:nvSpPr>
+          <p:cNvPr id="3" name="Notes Placeholder 2"/>
+          <p:cNvSpPr>
+            <a:spLocks noGrp="1"/>
+          </p:cNvSpPr>
+          <p:nvPr>
+            <p:ph type="body" idx="1"/>
+          </p:nvPr>
+        </p:nvSpPr>
+        <p:spPr/>
+        <p:txBody>
+          <a:bodyPr/>
+          <a:lstStyle/>
+          <a:p>
+            <a:r>
+              <a:rPr lang="ja-JP" altLang="en-US"/>
+              <a:t>研究の大体の流れですが、まずバドミントンの練習動画を画像処理してシャトルの軌道を検出します。次に、シャトルにどういった力がかかるかという物理モデルを考えシミュレーションします。最後にシミュレーション結果と現実の軌道を比較し、空気抵抗特性を求めます。</a:t>
+            </a:r>
+            <a:endParaRPr lang="en-US"/>
+          </a:p>
+        </p:txBody>
+      </p:sp>
+      <p:sp>
+        <p:nvSpPr>
+          <p:cNvPr id="4" name="Slide Number Placeholder 3"/>
+          <p:cNvSpPr>
+            <a:spLocks noGrp="1"/>
+          </p:cNvSpPr>
+          <p:nvPr>
+            <p:ph type="sldNum" sz="quarter" idx="10"/>
+          </p:nvPr>
+        </p:nvSpPr>
+        <p:spPr/>
+        <p:txBody>
+          <a:bodyPr/>
+          <a:lstStyle/>
+          <a:p>
+            <a:fld id="{61549E49-E5BF-D04D-AC87-92E43090F338}" type="slidenum">
+              <a:rPr lang="en-US" smtClean="0"/>
+              <a:t>4</a:t>
+            </a:fld>
+            <a:endParaRPr lang="en-US"/>
+          </a:p>
+        </p:txBody>
+      </p:sp>
+    </p:spTree>
+    <p:extLst>
+      <p:ext uri="{BB962C8B-B14F-4D97-AF65-F5344CB8AC3E}">
+        <p14:creationId xmlns:p14="http://schemas.microsoft.com/office/powerpoint/2010/main" val="1531758595"/>
+      </p:ext>
+    </p:extLst>
+  </p:cSld>
+  <p:clrMapOvr>
+    <a:masterClrMapping/>
+  </p:clrMapOvr>
+</p:notes>
+</file>
+
+<file path=ppt/notesSlides/notesSlide5.xml><?xml version="1.0" encoding="utf-8"?>
+<p:notes xmlns:a="http://schemas.openxmlformats.org/drawingml/2006/main" xmlns:r="http://schemas.openxmlformats.org/officeDocument/2006/relationships" xmlns:p="http://schemas.openxmlformats.org/presentationml/2006/main">
+  <p:cSld>
+    <p:spTree>
+      <p:nvGrpSpPr>
+        <p:cNvPr id="1" name=""/>
+        <p:cNvGrpSpPr/>
+        <p:nvPr/>
+      </p:nvGrpSpPr>
+      <p:grpSpPr>
+        <a:xfrm>
+          <a:off x="0" y="0"/>
+          <a:ext cx="0" cy="0"/>
+          <a:chOff x="0" y="0"/>
+          <a:chExt cx="0" cy="0"/>
+        </a:xfrm>
+      </p:grpSpPr>
+      <p:sp>
+        <p:nvSpPr>
+          <p:cNvPr id="2" name="Slide Image Placeholder 1"/>
+          <p:cNvSpPr>
+            <a:spLocks noGrp="1" noRot="1" noChangeAspect="1"/>
+          </p:cNvSpPr>
+          <p:nvPr>
+            <p:ph type="sldImg"/>
+          </p:nvPr>
+        </p:nvSpPr>
+        <p:spPr/>
+      </p:sp>
+      <p:sp>
+        <p:nvSpPr>
+          <p:cNvPr id="3" name="Notes Placeholder 2"/>
+          <p:cNvSpPr>
+            <a:spLocks noGrp="1"/>
+          </p:cNvSpPr>
+          <p:nvPr>
+            <p:ph type="body" idx="1"/>
+          </p:nvPr>
+        </p:nvSpPr>
+        <p:spPr/>
+        <p:txBody>
+          <a:bodyPr/>
+          <a:lstStyle/>
+          <a:p>
+            <a:r>
+              <a:rPr lang="ja-JP" altLang="en-US"/>
+              <a:t>動画からフレームを取ってきて、背景差分法で動体を検出します。次に、ラベリングを行い、検出した動体の各領域の重心座標と面積を取得します。ここで面積値の小さいものはノイズとして除去します。</a:t>
+            </a:r>
+            <a:r>
+              <a:rPr lang="en-US" altLang="ja-JP"/>
+              <a:t>1</a:t>
+            </a:r>
+            <a:r>
+              <a:rPr lang="ja-JP" altLang="en-US"/>
+              <a:t>つ前のフレームと今のフレームを比較して重心の</a:t>
+            </a:r>
+            <a:r>
+              <a:rPr lang="en-US" altLang="ja-JP"/>
+              <a:t>x</a:t>
+            </a:r>
+            <a:r>
+              <a:rPr lang="ja-JP" altLang="en-US"/>
+              <a:t>座標の変位を調べて、ネットをまたぐ動体をシャトルとして検出します。最初にこの赤の</a:t>
+            </a:r>
+            <a:r>
+              <a:rPr lang="en-US" altLang="ja-JP"/>
+              <a:t>2</a:t>
+            </a:r>
+            <a:r>
+              <a:rPr lang="ja-JP" altLang="en-US"/>
+              <a:t>点が検出でき、シャトルが左から右へ横切った場合は前のフレームを走査することで左側の軌道を取得でき後のフレームを走査することで右側の軌道を取得できます。走査するときに見るのは座標と面積変化、つまり点が近くにあるかどうかとシャトルっぽい面積かどうかです。この方法でシャトルを検出しました。</a:t>
+            </a:r>
+            <a:endParaRPr lang="en-US"/>
+          </a:p>
+        </p:txBody>
+      </p:sp>
+      <p:sp>
+        <p:nvSpPr>
+          <p:cNvPr id="4" name="Slide Number Placeholder 3"/>
+          <p:cNvSpPr>
+            <a:spLocks noGrp="1"/>
+          </p:cNvSpPr>
+          <p:nvPr>
+            <p:ph type="sldNum" sz="quarter" idx="10"/>
+          </p:nvPr>
+        </p:nvSpPr>
+        <p:spPr/>
+        <p:txBody>
+          <a:bodyPr/>
+          <a:lstStyle/>
+          <a:p>
+            <a:fld id="{61549E49-E5BF-D04D-AC87-92E43090F338}" type="slidenum">
+              <a:rPr lang="en-US" smtClean="0"/>
+              <a:t>5</a:t>
+            </a:fld>
+            <a:endParaRPr lang="en-US"/>
+          </a:p>
+        </p:txBody>
+      </p:sp>
+    </p:spTree>
+    <p:extLst>
+      <p:ext uri="{BB962C8B-B14F-4D97-AF65-F5344CB8AC3E}">
+        <p14:creationId xmlns:p14="http://schemas.microsoft.com/office/powerpoint/2010/main" val="1745993050"/>
+      </p:ext>
+    </p:extLst>
+  </p:cSld>
+  <p:clrMapOvr>
+    <a:masterClrMapping/>
+  </p:clrMapOvr>
+</p:notes>
+</file>
+
 <file path=ppt/slideLayouts/slideLayout1.xml><?xml version="1.0" encoding="utf-8"?>
 <p:sldLayout xmlns:a="http://schemas.openxmlformats.org/drawingml/2006/main" xmlns:r="http://schemas.openxmlformats.org/officeDocument/2006/relationships" xmlns:p="http://schemas.openxmlformats.org/presentationml/2006/main" showMasterSp="0" type="title" preserve="1">
   <p:cSld name="Title Slide">
@@ -701,7 +1185,7 @@
           <a:p>
             <a:fld id="{9BF13121-D543-BF41-865B-690BCF45D296}" type="datetimeFigureOut">
               <a:rPr lang="en-US" smtClean="0"/>
-              <a:t>10/28/17</a:t>
+              <a:t>10/30/17</a:t>
             </a:fld>
             <a:endParaRPr lang="en-US" dirty="0"/>
           </a:p>
@@ -904,7 +1388,7 @@
           <a:p>
             <a:fld id="{9BF13121-D543-BF41-865B-690BCF45D296}" type="datetimeFigureOut">
               <a:rPr lang="en-US" smtClean="0"/>
-              <a:t>10/28/17</a:t>
+              <a:t>10/30/17</a:t>
             </a:fld>
             <a:endParaRPr lang="en-US" dirty="0"/>
           </a:p>
@@ -1155,7 +1639,7 @@
           <a:p>
             <a:fld id="{9BF13121-D543-BF41-865B-690BCF45D296}" type="datetimeFigureOut">
               <a:rPr lang="en-US" smtClean="0"/>
-              <a:t>10/28/17</a:t>
+              <a:t>10/30/17</a:t>
             </a:fld>
             <a:endParaRPr lang="en-US" dirty="0"/>
           </a:p>
@@ -1324,7 +1808,7 @@
           <a:p>
             <a:fld id="{9BF13121-D543-BF41-865B-690BCF45D296}" type="datetimeFigureOut">
               <a:rPr lang="en-US" smtClean="0"/>
-              <a:t>10/28/17</a:t>
+              <a:t>10/30/17</a:t>
             </a:fld>
             <a:endParaRPr lang="en-US" dirty="0"/>
           </a:p>
@@ -1662,7 +2146,7 @@
           <a:p>
             <a:fld id="{9BF13121-D543-BF41-865B-690BCF45D296}" type="datetimeFigureOut">
               <a:rPr lang="en-US" smtClean="0"/>
-              <a:t>10/28/17</a:t>
+              <a:t>10/30/17</a:t>
             </a:fld>
             <a:endParaRPr lang="en-US" dirty="0"/>
           </a:p>
@@ -1932,7 +2416,7 @@
           <a:p>
             <a:fld id="{9BF13121-D543-BF41-865B-690BCF45D296}" type="datetimeFigureOut">
               <a:rPr lang="en-US" smtClean="0"/>
-              <a:t>10/28/17</a:t>
+              <a:t>10/30/17</a:t>
             </a:fld>
             <a:endParaRPr lang="en-US" dirty="0"/>
           </a:p>
@@ -2311,7 +2795,7 @@
           <a:p>
             <a:fld id="{9BF13121-D543-BF41-865B-690BCF45D296}" type="datetimeFigureOut">
               <a:rPr lang="en-US" smtClean="0"/>
-              <a:t>10/28/17</a:t>
+              <a:t>10/30/17</a:t>
             </a:fld>
             <a:endParaRPr lang="en-US" dirty="0"/>
           </a:p>
@@ -2429,7 +2913,7 @@
           <a:p>
             <a:fld id="{9BF13121-D543-BF41-865B-690BCF45D296}" type="datetimeFigureOut">
               <a:rPr lang="en-US" smtClean="0"/>
-              <a:t>10/28/17</a:t>
+              <a:t>10/30/17</a:t>
             </a:fld>
             <a:endParaRPr lang="en-US" dirty="0"/>
           </a:p>
@@ -2595,7 +3079,7 @@
           <a:p>
             <a:fld id="{9BF13121-D543-BF41-865B-690BCF45D296}" type="datetimeFigureOut">
               <a:rPr lang="en-US" smtClean="0"/>
-              <a:t>10/28/17</a:t>
+              <a:t>10/30/17</a:t>
             </a:fld>
             <a:endParaRPr lang="en-US" dirty="0"/>
           </a:p>
@@ -2944,7 +3428,7 @@
           <a:p>
             <a:fld id="{9BF13121-D543-BF41-865B-690BCF45D296}" type="datetimeFigureOut">
               <a:rPr lang="en-US" smtClean="0"/>
-              <a:t>10/28/17</a:t>
+              <a:t>10/30/17</a:t>
             </a:fld>
             <a:endParaRPr lang="en-US" dirty="0"/>
           </a:p>
@@ -3323,7 +3807,7 @@
           <a:p>
             <a:fld id="{9BF13121-D543-BF41-865B-690BCF45D296}" type="datetimeFigureOut">
               <a:rPr lang="en-US" smtClean="0"/>
-              <a:t>10/28/17</a:t>
+              <a:t>10/30/17</a:t>
             </a:fld>
             <a:endParaRPr lang="en-US" dirty="0"/>
           </a:p>
@@ -3605,7 +4089,7 @@
           <a:p>
             <a:fld id="{9BF13121-D543-BF41-865B-690BCF45D296}" type="datetimeFigureOut">
               <a:rPr lang="en-US" smtClean="0"/>
-              <a:t>10/28/17</a:t>
+              <a:t>10/30/17</a:t>
             </a:fld>
             <a:endParaRPr lang="en-US" dirty="0"/>
           </a:p>
@@ -4235,6 +4719,35 @@
           </a:p>
         </p:txBody>
       </p:sp>
+      <p:sp>
+        <p:nvSpPr>
+          <p:cNvPr id="4" name="TextBox 3"/>
+          <p:cNvSpPr txBox="1"/>
+          <p:nvPr/>
+        </p:nvSpPr>
+        <p:spPr>
+          <a:xfrm>
+            <a:off x="1588784" y="3408958"/>
+            <a:ext cx="9080691" cy="400110"/>
+          </a:xfrm>
+          <a:prstGeom prst="rect">
+            <a:avLst/>
+          </a:prstGeom>
+          <a:noFill/>
+        </p:spPr>
+        <p:txBody>
+          <a:bodyPr wrap="none" rtlCol="0">
+            <a:spAutoFit/>
+          </a:bodyPr>
+          <a:lstStyle/>
+          <a:p>
+            <a:r>
+              <a:rPr lang="en-US" sz="2000"/>
+              <a:t>Air resistance measurement for guess optical movement in sport by image processing</a:t>
+            </a:r>
+          </a:p>
+        </p:txBody>
+      </p:sp>
     </p:spTree>
     <p:extLst>
       <p:ext uri="{BB962C8B-B14F-4D97-AF65-F5344CB8AC3E}">
@@ -4321,8 +4834,8 @@
             <a:chExt cx="6018804" cy="1541488"/>
           </a:xfrm>
         </p:grpSpPr>
-        <mc:AlternateContent xmlns:mc="http://schemas.openxmlformats.org/markup-compatibility/2006">
-          <mc:Choice xmlns:a14="http://schemas.microsoft.com/office/drawing/2010/main" Requires="a14">
+        <mc:AlternateContent xmlns:mc="http://schemas.openxmlformats.org/markup-compatibility/2006" xmlns:a14="http://schemas.microsoft.com/office/drawing/2010/main">
+          <mc:Choice Requires="a14">
             <p:sp>
               <p:nvSpPr>
                 <p:cNvPr id="4" name="TextBox 3"/>
@@ -4574,7 +5087,7 @@
               </p:txBody>
             </p:sp>
           </mc:Choice>
-          <mc:Fallback>
+          <mc:Fallback xmlns="">
             <p:sp>
               <p:nvSpPr>
                 <p:cNvPr id="4" name="TextBox 3"/>
@@ -4613,8 +5126,8 @@
             </p:sp>
           </mc:Fallback>
         </mc:AlternateContent>
-        <mc:AlternateContent xmlns:mc="http://schemas.openxmlformats.org/markup-compatibility/2006">
-          <mc:Choice xmlns:a14="http://schemas.microsoft.com/office/drawing/2010/main" Requires="a14">
+        <mc:AlternateContent xmlns:mc="http://schemas.openxmlformats.org/markup-compatibility/2006" xmlns:a14="http://schemas.microsoft.com/office/drawing/2010/main">
+          <mc:Choice Requires="a14">
             <p:sp>
               <p:nvSpPr>
                 <p:cNvPr id="5" name="TextBox 4"/>
@@ -4892,7 +5405,7 @@
               </p:txBody>
             </p:sp>
           </mc:Choice>
-          <mc:Fallback>
+          <mc:Fallback xmlns="">
             <p:sp>
               <p:nvSpPr>
                 <p:cNvPr id="5" name="TextBox 4"/>
@@ -5041,15 +5554,7 @@
                   <a:ea typeface="MS Mincho" charset="-128"/>
                   <a:cs typeface="MS Mincho" charset="-128"/>
                 </a:rPr>
-                <a:t>座標</a:t>
-              </a:r>
-              <a:r>
-                <a:rPr lang="ja-JP" altLang="en-US" dirty="0" smtClean="0">
-                  <a:latin typeface="MS Mincho" charset="-128"/>
-                  <a:ea typeface="MS Mincho" charset="-128"/>
-                  <a:cs typeface="MS Mincho" charset="-128"/>
-                </a:rPr>
-                <a:t>の更新式</a:t>
+                <a:t>座標の更新式</a:t>
               </a:r>
               <a:endParaRPr lang="en-US" altLang="ja-JP" dirty="0" smtClean="0">
                 <a:latin typeface="MS Mincho" charset="-128"/>
@@ -5060,8 +5565,8 @@
           </p:txBody>
         </p:sp>
       </p:grpSp>
-      <mc:AlternateContent xmlns:mc="http://schemas.openxmlformats.org/markup-compatibility/2006">
-        <mc:Choice xmlns:a14="http://schemas.microsoft.com/office/drawing/2010/main" Requires="a14">
+      <mc:AlternateContent xmlns:mc="http://schemas.openxmlformats.org/markup-compatibility/2006" xmlns:a14="http://schemas.microsoft.com/office/drawing/2010/main">
+        <mc:Choice Requires="a14">
           <p:sp>
             <p:nvSpPr>
               <p:cNvPr id="9" name="TextBox 8"/>
@@ -5216,7 +5721,7 @@
             </p:txBody>
           </p:sp>
         </mc:Choice>
-        <mc:Fallback>
+        <mc:Fallback xmlns="">
           <p:sp>
             <p:nvSpPr>
               <p:cNvPr id="9" name="TextBox 8"/>
@@ -5269,8 +5774,8 @@
             <a:chExt cx="5502917" cy="555793"/>
           </a:xfrm>
         </p:grpSpPr>
-        <mc:AlternateContent xmlns:mc="http://schemas.openxmlformats.org/markup-compatibility/2006">
-          <mc:Choice xmlns:a14="http://schemas.microsoft.com/office/drawing/2010/main" Requires="a14">
+        <mc:AlternateContent xmlns:mc="http://schemas.openxmlformats.org/markup-compatibility/2006" xmlns:a14="http://schemas.microsoft.com/office/drawing/2010/main">
+          <mc:Choice Requires="a14">
             <p:sp>
               <p:nvSpPr>
                 <p:cNvPr id="3" name="TextBox 2"/>
@@ -5653,7 +6158,7 @@
               </p:txBody>
             </p:sp>
           </mc:Choice>
-          <mc:Fallback>
+          <mc:Fallback xmlns="">
             <p:sp>
               <p:nvSpPr>
                 <p:cNvPr id="3" name="TextBox 2"/>
@@ -5849,8 +6354,8 @@
           </a:p>
         </p:txBody>
       </p:sp>
-      <mc:AlternateContent xmlns:mc="http://schemas.openxmlformats.org/markup-compatibility/2006">
-        <mc:Choice xmlns:a14="http://schemas.microsoft.com/office/drawing/2010/main" Requires="a14">
+      <mc:AlternateContent xmlns:mc="http://schemas.openxmlformats.org/markup-compatibility/2006" xmlns:a14="http://schemas.microsoft.com/office/drawing/2010/main">
+        <mc:Choice Requires="a14">
           <p:sp>
             <p:nvSpPr>
               <p:cNvPr id="15" name="Rectangle 14"/>
@@ -5872,6 +6377,7 @@
               </a:bodyPr>
               <a:lstStyle/>
               <a:p>
+                <a:pPr/>
                 <a14:m>
                   <m:oMathPara xmlns:m="http://schemas.openxmlformats.org/officeDocument/2006/math">
                     <m:oMathParaPr>
@@ -6048,7 +6554,7 @@
             </p:txBody>
           </p:sp>
         </mc:Choice>
-        <mc:Fallback>
+        <mc:Fallback xmlns="">
           <p:sp>
             <p:nvSpPr>
               <p:cNvPr id="15" name="Rectangle 14"/>
@@ -6139,8 +6645,8 @@
             <a:chExt cx="4236738" cy="619913"/>
           </a:xfrm>
         </p:grpSpPr>
-        <mc:AlternateContent xmlns:mc="http://schemas.openxmlformats.org/markup-compatibility/2006">
-          <mc:Choice xmlns:a14="http://schemas.microsoft.com/office/drawing/2010/main" Requires="a14">
+        <mc:AlternateContent xmlns:mc="http://schemas.openxmlformats.org/markup-compatibility/2006" xmlns:a14="http://schemas.microsoft.com/office/drawing/2010/main">
+          <mc:Choice Requires="a14">
             <p:sp>
               <p:nvSpPr>
                 <p:cNvPr id="18" name="Rectangle 17"/>
@@ -6162,6 +6668,7 @@
                 </a:bodyPr>
                 <a:lstStyle/>
                 <a:p>
+                  <a:pPr/>
                   <a14:m>
                     <m:oMathPara xmlns:m="http://schemas.openxmlformats.org/officeDocument/2006/math">
                       <m:oMathParaPr>
@@ -6271,7 +6778,7 @@
               </p:txBody>
             </p:sp>
           </mc:Choice>
-          <mc:Fallback>
+          <mc:Fallback xmlns="">
             <p:sp>
               <p:nvSpPr>
                 <p:cNvPr id="18" name="Rectangle 17"/>
@@ -6455,23 +6962,1658 @@
       </p:sp>
       <p:sp>
         <p:nvSpPr>
-          <p:cNvPr id="3" name="Content Placeholder 2"/>
-          <p:cNvSpPr>
-            <a:spLocks noGrp="1"/>
-          </p:cNvSpPr>
-          <p:nvPr>
-            <p:ph idx="1"/>
-          </p:nvPr>
-        </p:nvSpPr>
-        <p:spPr/>
-        <p:txBody>
-          <a:bodyPr/>
+          <p:cNvPr id="5" name="TextBox 4"/>
+          <p:cNvSpPr txBox="1"/>
+          <p:nvPr/>
+        </p:nvSpPr>
+        <p:spPr>
+          <a:xfrm>
+            <a:off x="1125614" y="1954989"/>
+            <a:ext cx="2262158" cy="369332"/>
+          </a:xfrm>
+          <a:prstGeom prst="rect">
+            <a:avLst/>
+          </a:prstGeom>
+          <a:noFill/>
+        </p:spPr>
+        <p:txBody>
+          <a:bodyPr wrap="none" rtlCol="0">
+            <a:spAutoFit/>
+          </a:bodyPr>
           <a:lstStyle/>
           <a:p>
-            <a:endParaRPr lang="en-US"/>
-          </a:p>
-        </p:txBody>
-      </p:sp>
+            <a:r>
+              <a:rPr lang="ja-JP" altLang="en-US" dirty="0" smtClean="0">
+                <a:latin typeface="MS Mincho" charset="-128"/>
+                <a:ea typeface="MS Mincho" charset="-128"/>
+                <a:cs typeface="MS Mincho" charset="-128"/>
+              </a:rPr>
+              <a:t>・粘性抵抗の更新式</a:t>
+            </a:r>
+            <a:endParaRPr lang="en-US" altLang="ja-JP" dirty="0" smtClean="0">
+              <a:latin typeface="MS Mincho" charset="-128"/>
+              <a:ea typeface="MS Mincho" charset="-128"/>
+              <a:cs typeface="MS Mincho" charset="-128"/>
+            </a:endParaRPr>
+          </a:p>
+        </p:txBody>
+      </p:sp>
+      <p:grpSp>
+        <p:nvGrpSpPr>
+          <p:cNvPr id="13" name="Group 12"/>
+          <p:cNvGrpSpPr/>
+          <p:nvPr/>
+        </p:nvGrpSpPr>
+        <p:grpSpPr>
+          <a:xfrm>
+            <a:off x="2851383" y="2541950"/>
+            <a:ext cx="5478871" cy="1345117"/>
+            <a:chOff x="4332402" y="2715007"/>
+            <a:chExt cx="5478871" cy="1345117"/>
+          </a:xfrm>
+        </p:grpSpPr>
+        <mc:AlternateContent xmlns:mc="http://schemas.openxmlformats.org/markup-compatibility/2006" xmlns:a14="http://schemas.microsoft.com/office/drawing/2010/main">
+          <mc:Choice Requires="a14">
+            <p:sp>
+              <p:nvSpPr>
+                <p:cNvPr id="4" name="TextBox 3"/>
+                <p:cNvSpPr txBox="1"/>
+                <p:nvPr/>
+              </p:nvSpPr>
+              <p:spPr>
+                <a:xfrm>
+                  <a:off x="5530422" y="2715007"/>
+                  <a:ext cx="3025828" cy="563744"/>
+                </a:xfrm>
+                <a:prstGeom prst="rect">
+                  <a:avLst/>
+                </a:prstGeom>
+                <a:noFill/>
+              </p:spPr>
+              <p:txBody>
+                <a:bodyPr wrap="none" lIns="0" tIns="0" rIns="0" bIns="0" rtlCol="0">
+                  <a:spAutoFit/>
+                </a:bodyPr>
+                <a:lstStyle/>
+                <a:p>
+                  <a:pPr/>
+                  <a14:m>
+                    <m:oMathPara xmlns:m="http://schemas.openxmlformats.org/officeDocument/2006/math">
+                      <m:oMathParaPr>
+                        <m:jc m:val="centerGroup"/>
+                      </m:oMathParaPr>
+                      <m:oMath xmlns:m="http://schemas.openxmlformats.org/officeDocument/2006/math">
+                        <m:sSub>
+                          <m:sSubPr>
+                            <m:ctrlPr>
+                              <a:rPr lang="en-US" b="0" i="1" smtClean="0">
+                                <a:latin typeface="Cambria Math" charset="0"/>
+                              </a:rPr>
+                            </m:ctrlPr>
+                          </m:sSubPr>
+                          <m:e>
+                            <m:r>
+                              <a:rPr lang="en-US" b="0" i="1" smtClean="0">
+                                <a:latin typeface="Cambria Math" charset="0"/>
+                              </a:rPr>
+                              <m:t>𝑣</m:t>
+                            </m:r>
+                          </m:e>
+                          <m:sub>
+                            <m:r>
+                              <a:rPr lang="en-US" b="0" i="1" smtClean="0">
+                                <a:latin typeface="Cambria Math" charset="0"/>
+                              </a:rPr>
+                              <m:t>𝑥</m:t>
+                            </m:r>
+                          </m:sub>
+                        </m:sSub>
+                        <m:d>
+                          <m:dPr>
+                            <m:ctrlPr>
+                              <a:rPr lang="en-US" b="0" i="1" smtClean="0">
+                                <a:latin typeface="Cambria Math" charset="0"/>
+                              </a:rPr>
+                            </m:ctrlPr>
+                          </m:dPr>
+                          <m:e>
+                            <m:r>
+                              <a:rPr lang="en-US" b="0" i="1" smtClean="0">
+                                <a:latin typeface="Cambria Math" charset="0"/>
+                              </a:rPr>
+                              <m:t>𝑡</m:t>
+                            </m:r>
+                            <m:r>
+                              <a:rPr lang="en-US" b="0" i="1" smtClean="0">
+                                <a:latin typeface="Cambria Math" charset="0"/>
+                              </a:rPr>
+                              <m:t>+∆</m:t>
+                            </m:r>
+                            <m:r>
+                              <a:rPr lang="en-US" b="0" i="1" smtClean="0">
+                                <a:latin typeface="Cambria Math" charset="0"/>
+                                <a:ea typeface="Cambria Math" charset="0"/>
+                                <a:cs typeface="Cambria Math" charset="0"/>
+                              </a:rPr>
+                              <m:t>𝑡</m:t>
+                            </m:r>
+                          </m:e>
+                        </m:d>
+                        <m:r>
+                          <a:rPr lang="en-US" b="0" i="1" smtClean="0">
+                            <a:latin typeface="Cambria Math" charset="0"/>
+                            <a:ea typeface="Cambria Math" charset="0"/>
+                            <a:cs typeface="Cambria Math" charset="0"/>
+                          </a:rPr>
+                          <m:t>=</m:t>
+                        </m:r>
+                        <m:f>
+                          <m:fPr>
+                            <m:ctrlPr>
+                              <a:rPr lang="en-US" b="0" i="1" smtClean="0">
+                                <a:latin typeface="Cambria Math" charset="0"/>
+                                <a:ea typeface="Cambria Math" charset="0"/>
+                                <a:cs typeface="Cambria Math" charset="0"/>
+                              </a:rPr>
+                            </m:ctrlPr>
+                          </m:fPr>
+                          <m:num>
+                            <m:r>
+                              <a:rPr lang="en-US" b="0" i="1" smtClean="0">
+                                <a:latin typeface="Cambria Math" charset="0"/>
+                                <a:ea typeface="Cambria Math" charset="0"/>
+                                <a:cs typeface="Cambria Math" charset="0"/>
+                              </a:rPr>
+                              <m:t>2</m:t>
+                            </m:r>
+                            <m:r>
+                              <a:rPr lang="en-US" b="0" i="1" smtClean="0">
+                                <a:latin typeface="Cambria Math" charset="0"/>
+                                <a:ea typeface="Cambria Math" charset="0"/>
+                                <a:cs typeface="Cambria Math" charset="0"/>
+                              </a:rPr>
+                              <m:t>𝑚</m:t>
+                            </m:r>
+                            <m:r>
+                              <a:rPr lang="en-US" b="0" i="1" smtClean="0">
+                                <a:latin typeface="Cambria Math" charset="0"/>
+                                <a:ea typeface="Cambria Math" charset="0"/>
+                                <a:cs typeface="Cambria Math" charset="0"/>
+                              </a:rPr>
+                              <m:t>−</m:t>
+                            </m:r>
+                            <m:r>
+                              <a:rPr lang="en-US" b="0" i="1" smtClean="0">
+                                <a:latin typeface="Cambria Math" charset="0"/>
+                                <a:ea typeface="Cambria Math" charset="0"/>
+                                <a:cs typeface="Cambria Math" charset="0"/>
+                              </a:rPr>
+                              <m:t>𝛾</m:t>
+                            </m:r>
+                            <m:r>
+                              <a:rPr lang="en-US" b="0" i="1" smtClean="0">
+                                <a:latin typeface="Cambria Math" charset="0"/>
+                                <a:ea typeface="Cambria Math" charset="0"/>
+                                <a:cs typeface="Cambria Math" charset="0"/>
+                              </a:rPr>
+                              <m:t>∆</m:t>
+                            </m:r>
+                            <m:r>
+                              <a:rPr lang="en-US" b="0" i="1" smtClean="0">
+                                <a:latin typeface="Cambria Math" charset="0"/>
+                                <a:ea typeface="Cambria Math" charset="0"/>
+                                <a:cs typeface="Cambria Math" charset="0"/>
+                              </a:rPr>
+                              <m:t>𝑡</m:t>
+                            </m:r>
+                          </m:num>
+                          <m:den>
+                            <m:r>
+                              <a:rPr lang="en-US" b="0" i="1" smtClean="0">
+                                <a:latin typeface="Cambria Math" charset="0"/>
+                                <a:ea typeface="Cambria Math" charset="0"/>
+                                <a:cs typeface="Cambria Math" charset="0"/>
+                              </a:rPr>
+                              <m:t>2</m:t>
+                            </m:r>
+                            <m:r>
+                              <a:rPr lang="en-US" b="0" i="1" smtClean="0">
+                                <a:latin typeface="Cambria Math" charset="0"/>
+                                <a:ea typeface="Cambria Math" charset="0"/>
+                                <a:cs typeface="Cambria Math" charset="0"/>
+                              </a:rPr>
+                              <m:t>𝑚</m:t>
+                            </m:r>
+                            <m:r>
+                              <a:rPr lang="en-US" b="0" i="1" smtClean="0">
+                                <a:latin typeface="Cambria Math" charset="0"/>
+                                <a:ea typeface="Cambria Math" charset="0"/>
+                                <a:cs typeface="Cambria Math" charset="0"/>
+                              </a:rPr>
+                              <m:t>+</m:t>
+                            </m:r>
+                            <m:r>
+                              <a:rPr lang="en-US" b="0" i="1" smtClean="0">
+                                <a:latin typeface="Cambria Math" charset="0"/>
+                                <a:ea typeface="Cambria Math" charset="0"/>
+                                <a:cs typeface="Cambria Math" charset="0"/>
+                              </a:rPr>
+                              <m:t>𝛾</m:t>
+                            </m:r>
+                            <m:r>
+                              <a:rPr lang="en-US" b="0" i="1" smtClean="0">
+                                <a:latin typeface="Cambria Math" charset="0"/>
+                                <a:ea typeface="Cambria Math" charset="0"/>
+                                <a:cs typeface="Cambria Math" charset="0"/>
+                              </a:rPr>
+                              <m:t>∆</m:t>
+                            </m:r>
+                            <m:r>
+                              <a:rPr lang="en-US" b="0" i="1" smtClean="0">
+                                <a:latin typeface="Cambria Math" charset="0"/>
+                                <a:ea typeface="Cambria Math" charset="0"/>
+                                <a:cs typeface="Cambria Math" charset="0"/>
+                              </a:rPr>
+                              <m:t>𝑡</m:t>
+                            </m:r>
+                          </m:den>
+                        </m:f>
+                        <m:r>
+                          <a:rPr lang="en-US" i="1">
+                            <a:latin typeface="Cambria Math" charset="0"/>
+                            <a:ea typeface="Cambria Math" charset="0"/>
+                            <a:cs typeface="Cambria Math" charset="0"/>
+                          </a:rPr>
+                          <m:t>∙</m:t>
+                        </m:r>
+                        <m:sSub>
+                          <m:sSubPr>
+                            <m:ctrlPr>
+                              <a:rPr lang="en-US" i="1">
+                                <a:latin typeface="Cambria Math" charset="0"/>
+                                <a:ea typeface="Cambria Math" charset="0"/>
+                                <a:cs typeface="Cambria Math" charset="0"/>
+                              </a:rPr>
+                            </m:ctrlPr>
+                          </m:sSubPr>
+                          <m:e>
+                            <m:r>
+                              <a:rPr lang="en-US" b="0" i="1">
+                                <a:latin typeface="Cambria Math" charset="0"/>
+                                <a:ea typeface="Cambria Math" charset="0"/>
+                                <a:cs typeface="Cambria Math" charset="0"/>
+                              </a:rPr>
+                              <m:t>𝑣</m:t>
+                            </m:r>
+                          </m:e>
+                          <m:sub>
+                            <m:r>
+                              <a:rPr lang="en-US" b="0" i="1">
+                                <a:latin typeface="Cambria Math" charset="0"/>
+                                <a:ea typeface="Cambria Math" charset="0"/>
+                                <a:cs typeface="Cambria Math" charset="0"/>
+                              </a:rPr>
+                              <m:t>𝑥</m:t>
+                            </m:r>
+                          </m:sub>
+                        </m:sSub>
+                        <m:r>
+                          <a:rPr lang="en-US" b="0" i="1">
+                            <a:latin typeface="Cambria Math" charset="0"/>
+                            <a:ea typeface="Cambria Math" charset="0"/>
+                            <a:cs typeface="Cambria Math" charset="0"/>
+                          </a:rPr>
+                          <m:t>(</m:t>
+                        </m:r>
+                        <m:r>
+                          <a:rPr lang="en-US" b="0" i="1">
+                            <a:latin typeface="Cambria Math" charset="0"/>
+                            <a:ea typeface="Cambria Math" charset="0"/>
+                            <a:cs typeface="Cambria Math" charset="0"/>
+                          </a:rPr>
+                          <m:t>𝑡</m:t>
+                        </m:r>
+                        <m:r>
+                          <a:rPr lang="en-US" b="0" i="1">
+                            <a:latin typeface="Cambria Math" charset="0"/>
+                            <a:ea typeface="Cambria Math" charset="0"/>
+                            <a:cs typeface="Cambria Math" charset="0"/>
+                          </a:rPr>
+                          <m:t>)</m:t>
+                        </m:r>
+                      </m:oMath>
+                    </m:oMathPara>
+                  </a14:m>
+                  <a:endParaRPr lang="en-US" dirty="0"/>
+                </a:p>
+              </p:txBody>
+            </p:sp>
+          </mc:Choice>
+          <mc:Fallback xmlns="">
+            <p:sp>
+              <p:nvSpPr>
+                <p:cNvPr id="4" name="TextBox 3"/>
+                <p:cNvSpPr txBox="1">
+                  <a:spLocks noRot="1" noChangeAspect="1" noMove="1" noResize="1" noEditPoints="1" noAdjustHandles="1" noChangeArrowheads="1" noChangeShapeType="1" noTextEdit="1"/>
+                </p:cNvSpPr>
+                <p:nvPr/>
+              </p:nvSpPr>
+              <p:spPr>
+                <a:xfrm>
+                  <a:off x="5530422" y="2715007"/>
+                  <a:ext cx="3025828" cy="563744"/>
+                </a:xfrm>
+                <a:prstGeom prst="rect">
+                  <a:avLst/>
+                </a:prstGeom>
+                <a:blipFill rotWithShape="0">
+                  <a:blip r:embed="rId2"/>
+                  <a:stretch>
+                    <a:fillRect/>
+                  </a:stretch>
+                </a:blipFill>
+              </p:spPr>
+              <p:txBody>
+                <a:bodyPr/>
+                <a:lstStyle/>
+                <a:p>
+                  <a:r>
+                    <a:rPr lang="en-US">
+                      <a:noFill/>
+                    </a:rPr>
+                    <a:t> </a:t>
+                  </a:r>
+                </a:p>
+              </p:txBody>
+            </p:sp>
+          </mc:Fallback>
+        </mc:AlternateContent>
+        <mc:AlternateContent xmlns:mc="http://schemas.openxmlformats.org/markup-compatibility/2006" xmlns:a14="http://schemas.microsoft.com/office/drawing/2010/main">
+          <mc:Choice Requires="a14">
+            <p:sp>
+              <p:nvSpPr>
+                <p:cNvPr id="6" name="TextBox 5"/>
+                <p:cNvSpPr txBox="1"/>
+                <p:nvPr/>
+              </p:nvSpPr>
+              <p:spPr>
+                <a:xfrm>
+                  <a:off x="5530422" y="3496380"/>
+                  <a:ext cx="4280851" cy="563744"/>
+                </a:xfrm>
+                <a:prstGeom prst="rect">
+                  <a:avLst/>
+                </a:prstGeom>
+                <a:noFill/>
+              </p:spPr>
+              <p:txBody>
+                <a:bodyPr wrap="none" lIns="0" tIns="0" rIns="0" bIns="0" rtlCol="0">
+                  <a:spAutoFit/>
+                </a:bodyPr>
+                <a:lstStyle/>
+                <a:p>
+                  <a:pPr/>
+                  <a14:m>
+                    <m:oMathPara xmlns:m="http://schemas.openxmlformats.org/officeDocument/2006/math">
+                      <m:oMathParaPr>
+                        <m:jc m:val="centerGroup"/>
+                      </m:oMathParaPr>
+                      <m:oMath xmlns:m="http://schemas.openxmlformats.org/officeDocument/2006/math">
+                        <m:sSub>
+                          <m:sSubPr>
+                            <m:ctrlPr>
+                              <a:rPr lang="en-US" b="0" i="1" smtClean="0">
+                                <a:latin typeface="Cambria Math" charset="0"/>
+                              </a:rPr>
+                            </m:ctrlPr>
+                          </m:sSubPr>
+                          <m:e>
+                            <m:r>
+                              <a:rPr lang="en-US" b="0" i="1" smtClean="0">
+                                <a:latin typeface="Cambria Math" charset="0"/>
+                              </a:rPr>
+                              <m:t>𝑣</m:t>
+                            </m:r>
+                          </m:e>
+                          <m:sub>
+                            <m:r>
+                              <a:rPr lang="en-US" b="0" i="1" smtClean="0">
+                                <a:latin typeface="Cambria Math" charset="0"/>
+                              </a:rPr>
+                              <m:t>𝑦</m:t>
+                            </m:r>
+                          </m:sub>
+                        </m:sSub>
+                        <m:d>
+                          <m:dPr>
+                            <m:ctrlPr>
+                              <a:rPr lang="en-US" b="0" i="1" smtClean="0">
+                                <a:latin typeface="Cambria Math" charset="0"/>
+                              </a:rPr>
+                            </m:ctrlPr>
+                          </m:dPr>
+                          <m:e>
+                            <m:r>
+                              <a:rPr lang="en-US" b="0" i="1" smtClean="0">
+                                <a:latin typeface="Cambria Math" charset="0"/>
+                              </a:rPr>
+                              <m:t>𝑡</m:t>
+                            </m:r>
+                            <m:r>
+                              <a:rPr lang="en-US" b="0" i="1" smtClean="0">
+                                <a:latin typeface="Cambria Math" charset="0"/>
+                              </a:rPr>
+                              <m:t>+∆</m:t>
+                            </m:r>
+                            <m:r>
+                              <a:rPr lang="en-US" b="0" i="1" smtClean="0">
+                                <a:latin typeface="Cambria Math" charset="0"/>
+                                <a:ea typeface="Cambria Math" charset="0"/>
+                                <a:cs typeface="Cambria Math" charset="0"/>
+                              </a:rPr>
+                              <m:t>𝑡</m:t>
+                            </m:r>
+                          </m:e>
+                        </m:d>
+                        <m:r>
+                          <a:rPr lang="en-US" b="0" i="1" smtClean="0">
+                            <a:latin typeface="Cambria Math" charset="0"/>
+                            <a:ea typeface="Cambria Math" charset="0"/>
+                            <a:cs typeface="Cambria Math" charset="0"/>
+                          </a:rPr>
+                          <m:t>=</m:t>
+                        </m:r>
+                        <m:f>
+                          <m:fPr>
+                            <m:ctrlPr>
+                              <a:rPr lang="en-US" b="0" i="1" smtClean="0">
+                                <a:latin typeface="Cambria Math" charset="0"/>
+                                <a:ea typeface="Cambria Math" charset="0"/>
+                                <a:cs typeface="Cambria Math" charset="0"/>
+                              </a:rPr>
+                            </m:ctrlPr>
+                          </m:fPr>
+                          <m:num>
+                            <m:r>
+                              <a:rPr lang="en-US" b="0" i="1" smtClean="0">
+                                <a:latin typeface="Cambria Math" charset="0"/>
+                                <a:ea typeface="Cambria Math" charset="0"/>
+                                <a:cs typeface="Cambria Math" charset="0"/>
+                              </a:rPr>
+                              <m:t>2</m:t>
+                            </m:r>
+                            <m:r>
+                              <a:rPr lang="en-US" b="0" i="1" smtClean="0">
+                                <a:latin typeface="Cambria Math" charset="0"/>
+                                <a:ea typeface="Cambria Math" charset="0"/>
+                                <a:cs typeface="Cambria Math" charset="0"/>
+                              </a:rPr>
+                              <m:t>𝑚</m:t>
+                            </m:r>
+                            <m:r>
+                              <a:rPr lang="en-US" b="0" i="1" smtClean="0">
+                                <a:latin typeface="Cambria Math" charset="0"/>
+                                <a:ea typeface="Cambria Math" charset="0"/>
+                                <a:cs typeface="Cambria Math" charset="0"/>
+                              </a:rPr>
+                              <m:t>−</m:t>
+                            </m:r>
+                            <m:r>
+                              <a:rPr lang="en-US" b="0" i="1" smtClean="0">
+                                <a:latin typeface="Cambria Math" charset="0"/>
+                                <a:ea typeface="Cambria Math" charset="0"/>
+                                <a:cs typeface="Cambria Math" charset="0"/>
+                              </a:rPr>
+                              <m:t>𝛾</m:t>
+                            </m:r>
+                            <m:r>
+                              <a:rPr lang="en-US" b="0" i="1" smtClean="0">
+                                <a:latin typeface="Cambria Math" charset="0"/>
+                                <a:ea typeface="Cambria Math" charset="0"/>
+                                <a:cs typeface="Cambria Math" charset="0"/>
+                              </a:rPr>
+                              <m:t>∆</m:t>
+                            </m:r>
+                            <m:r>
+                              <a:rPr lang="en-US" b="0" i="1" smtClean="0">
+                                <a:latin typeface="Cambria Math" charset="0"/>
+                                <a:ea typeface="Cambria Math" charset="0"/>
+                                <a:cs typeface="Cambria Math" charset="0"/>
+                              </a:rPr>
+                              <m:t>𝑡</m:t>
+                            </m:r>
+                          </m:num>
+                          <m:den>
+                            <m:r>
+                              <a:rPr lang="en-US" b="0" i="1" smtClean="0">
+                                <a:latin typeface="Cambria Math" charset="0"/>
+                                <a:ea typeface="Cambria Math" charset="0"/>
+                                <a:cs typeface="Cambria Math" charset="0"/>
+                              </a:rPr>
+                              <m:t>2</m:t>
+                            </m:r>
+                            <m:r>
+                              <a:rPr lang="en-US" b="0" i="1" smtClean="0">
+                                <a:latin typeface="Cambria Math" charset="0"/>
+                                <a:ea typeface="Cambria Math" charset="0"/>
+                                <a:cs typeface="Cambria Math" charset="0"/>
+                              </a:rPr>
+                              <m:t>𝑚</m:t>
+                            </m:r>
+                            <m:r>
+                              <a:rPr lang="en-US" b="0" i="1" smtClean="0">
+                                <a:latin typeface="Cambria Math" charset="0"/>
+                                <a:ea typeface="Cambria Math" charset="0"/>
+                                <a:cs typeface="Cambria Math" charset="0"/>
+                              </a:rPr>
+                              <m:t>+</m:t>
+                            </m:r>
+                            <m:r>
+                              <a:rPr lang="en-US" b="0" i="1" smtClean="0">
+                                <a:latin typeface="Cambria Math" charset="0"/>
+                                <a:ea typeface="Cambria Math" charset="0"/>
+                                <a:cs typeface="Cambria Math" charset="0"/>
+                              </a:rPr>
+                              <m:t>𝛾</m:t>
+                            </m:r>
+                            <m:r>
+                              <a:rPr lang="en-US" b="0" i="1" smtClean="0">
+                                <a:latin typeface="Cambria Math" charset="0"/>
+                                <a:ea typeface="Cambria Math" charset="0"/>
+                                <a:cs typeface="Cambria Math" charset="0"/>
+                              </a:rPr>
+                              <m:t>∆</m:t>
+                            </m:r>
+                            <m:r>
+                              <a:rPr lang="en-US" b="0" i="1" smtClean="0">
+                                <a:latin typeface="Cambria Math" charset="0"/>
+                                <a:ea typeface="Cambria Math" charset="0"/>
+                                <a:cs typeface="Cambria Math" charset="0"/>
+                              </a:rPr>
+                              <m:t>𝑡</m:t>
+                            </m:r>
+                          </m:den>
+                        </m:f>
+                        <m:r>
+                          <a:rPr lang="en-US" i="1">
+                            <a:latin typeface="Cambria Math" charset="0"/>
+                            <a:ea typeface="Cambria Math" charset="0"/>
+                            <a:cs typeface="Cambria Math" charset="0"/>
+                          </a:rPr>
+                          <m:t>∙</m:t>
+                        </m:r>
+                        <m:sSub>
+                          <m:sSubPr>
+                            <m:ctrlPr>
+                              <a:rPr lang="en-US" i="1">
+                                <a:latin typeface="Cambria Math" charset="0"/>
+                                <a:ea typeface="Cambria Math" charset="0"/>
+                                <a:cs typeface="Cambria Math" charset="0"/>
+                              </a:rPr>
+                            </m:ctrlPr>
+                          </m:sSubPr>
+                          <m:e>
+                            <m:r>
+                              <a:rPr lang="en-US" b="0" i="1">
+                                <a:latin typeface="Cambria Math" charset="0"/>
+                                <a:ea typeface="Cambria Math" charset="0"/>
+                                <a:cs typeface="Cambria Math" charset="0"/>
+                              </a:rPr>
+                              <m:t>𝑣</m:t>
+                            </m:r>
+                          </m:e>
+                          <m:sub>
+                            <m:r>
+                              <a:rPr lang="en-US" b="0" i="1">
+                                <a:latin typeface="Cambria Math" charset="0"/>
+                                <a:ea typeface="Cambria Math" charset="0"/>
+                                <a:cs typeface="Cambria Math" charset="0"/>
+                              </a:rPr>
+                              <m:t>𝑦</m:t>
+                            </m:r>
+                          </m:sub>
+                        </m:sSub>
+                        <m:d>
+                          <m:dPr>
+                            <m:ctrlPr>
+                              <a:rPr lang="en-US" b="0" i="1">
+                                <a:latin typeface="Cambria Math" charset="0"/>
+                                <a:ea typeface="Cambria Math" charset="0"/>
+                                <a:cs typeface="Cambria Math" charset="0"/>
+                              </a:rPr>
+                            </m:ctrlPr>
+                          </m:dPr>
+                          <m:e>
+                            <m:r>
+                              <a:rPr lang="en-US" b="0" i="1">
+                                <a:latin typeface="Cambria Math" charset="0"/>
+                                <a:ea typeface="Cambria Math" charset="0"/>
+                                <a:cs typeface="Cambria Math" charset="0"/>
+                              </a:rPr>
+                              <m:t>𝑡</m:t>
+                            </m:r>
+                          </m:e>
+                        </m:d>
+                        <m:r>
+                          <a:rPr lang="en-US" b="0" i="1">
+                            <a:latin typeface="Cambria Math" charset="0"/>
+                            <a:ea typeface="Cambria Math" charset="0"/>
+                            <a:cs typeface="Cambria Math" charset="0"/>
+                          </a:rPr>
+                          <m:t>−</m:t>
+                        </m:r>
+                        <m:f>
+                          <m:fPr>
+                            <m:ctrlPr>
+                              <a:rPr lang="mr-IN" b="0" i="1">
+                                <a:latin typeface="Cambria Math" charset="0"/>
+                                <a:ea typeface="Cambria Math" charset="0"/>
+                                <a:cs typeface="Cambria Math" charset="0"/>
+                              </a:rPr>
+                            </m:ctrlPr>
+                          </m:fPr>
+                          <m:num>
+                            <m:r>
+                              <a:rPr lang="en-US" b="0" i="1">
+                                <a:latin typeface="Cambria Math" charset="0"/>
+                                <a:ea typeface="Cambria Math" charset="0"/>
+                                <a:cs typeface="Cambria Math" charset="0"/>
+                              </a:rPr>
+                              <m:t>2</m:t>
+                            </m:r>
+                            <m:r>
+                              <a:rPr lang="en-US" b="0" i="1">
+                                <a:latin typeface="Cambria Math" charset="0"/>
+                                <a:ea typeface="Cambria Math" charset="0"/>
+                                <a:cs typeface="Cambria Math" charset="0"/>
+                              </a:rPr>
+                              <m:t>𝑚𝑔</m:t>
+                            </m:r>
+                            <m:r>
+                              <a:rPr lang="en-US" b="0" i="1">
+                                <a:latin typeface="Cambria Math" charset="0"/>
+                                <a:ea typeface="Cambria Math" charset="0"/>
+                                <a:cs typeface="Cambria Math" charset="0"/>
+                              </a:rPr>
+                              <m:t>∆</m:t>
+                            </m:r>
+                            <m:r>
+                              <a:rPr lang="en-US" b="0" i="1">
+                                <a:latin typeface="Cambria Math" charset="0"/>
+                                <a:ea typeface="Cambria Math" charset="0"/>
+                                <a:cs typeface="Cambria Math" charset="0"/>
+                              </a:rPr>
+                              <m:t>𝑡</m:t>
+                            </m:r>
+                          </m:num>
+                          <m:den>
+                            <m:r>
+                              <a:rPr lang="en-US" b="0" i="1">
+                                <a:latin typeface="Cambria Math" charset="0"/>
+                                <a:ea typeface="Cambria Math" charset="0"/>
+                                <a:cs typeface="Cambria Math" charset="0"/>
+                              </a:rPr>
+                              <m:t>2</m:t>
+                            </m:r>
+                            <m:r>
+                              <a:rPr lang="en-US" b="0" i="1">
+                                <a:latin typeface="Cambria Math" charset="0"/>
+                                <a:ea typeface="Cambria Math" charset="0"/>
+                                <a:cs typeface="Cambria Math" charset="0"/>
+                              </a:rPr>
+                              <m:t>𝑚</m:t>
+                            </m:r>
+                            <m:r>
+                              <a:rPr lang="en-US" i="1">
+                                <a:latin typeface="Cambria Math" charset="0"/>
+                                <a:ea typeface="Cambria Math" charset="0"/>
+                                <a:cs typeface="Cambria Math" charset="0"/>
+                              </a:rPr>
+                              <m:t>+</m:t>
+                            </m:r>
+                            <m:r>
+                              <a:rPr lang="en-US" i="1">
+                                <a:latin typeface="Cambria Math" charset="0"/>
+                                <a:ea typeface="Cambria Math" charset="0"/>
+                                <a:cs typeface="Cambria Math" charset="0"/>
+                              </a:rPr>
+                              <m:t>𝛾</m:t>
+                            </m:r>
+                            <m:r>
+                              <a:rPr lang="en-US" i="1">
+                                <a:latin typeface="Cambria Math" charset="0"/>
+                                <a:ea typeface="Cambria Math" charset="0"/>
+                                <a:cs typeface="Cambria Math" charset="0"/>
+                              </a:rPr>
+                              <m:t>∆</m:t>
+                            </m:r>
+                            <m:r>
+                              <a:rPr lang="en-US" i="1">
+                                <a:latin typeface="Cambria Math" charset="0"/>
+                                <a:ea typeface="Cambria Math" charset="0"/>
+                                <a:cs typeface="Cambria Math" charset="0"/>
+                              </a:rPr>
+                              <m:t>𝑡</m:t>
+                            </m:r>
+                          </m:den>
+                        </m:f>
+                      </m:oMath>
+                    </m:oMathPara>
+                  </a14:m>
+                  <a:endParaRPr lang="en-US" dirty="0"/>
+                </a:p>
+              </p:txBody>
+            </p:sp>
+          </mc:Choice>
+          <mc:Fallback xmlns="">
+            <p:sp>
+              <p:nvSpPr>
+                <p:cNvPr id="6" name="TextBox 5"/>
+                <p:cNvSpPr txBox="1">
+                  <a:spLocks noRot="1" noChangeAspect="1" noMove="1" noResize="1" noEditPoints="1" noAdjustHandles="1" noChangeArrowheads="1" noChangeShapeType="1" noTextEdit="1"/>
+                </p:cNvSpPr>
+                <p:nvPr/>
+              </p:nvSpPr>
+              <p:spPr>
+                <a:xfrm>
+                  <a:off x="5530422" y="3496380"/>
+                  <a:ext cx="4280851" cy="563744"/>
+                </a:xfrm>
+                <a:prstGeom prst="rect">
+                  <a:avLst/>
+                </a:prstGeom>
+                <a:blipFill rotWithShape="0">
+                  <a:blip r:embed="rId3"/>
+                  <a:stretch>
+                    <a:fillRect/>
+                  </a:stretch>
+                </a:blipFill>
+              </p:spPr>
+              <p:txBody>
+                <a:bodyPr/>
+                <a:lstStyle/>
+                <a:p>
+                  <a:r>
+                    <a:rPr lang="en-US">
+                      <a:noFill/>
+                    </a:rPr>
+                    <a:t> </a:t>
+                  </a:r>
+                </a:p>
+              </p:txBody>
+            </p:sp>
+          </mc:Fallback>
+        </mc:AlternateContent>
+        <p:sp>
+          <p:nvSpPr>
+            <p:cNvPr id="9" name="Left Brace 8"/>
+            <p:cNvSpPr/>
+            <p:nvPr/>
+          </p:nvSpPr>
+          <p:spPr>
+            <a:xfrm>
+              <a:off x="5132228" y="2715007"/>
+              <a:ext cx="244699" cy="1345117"/>
+            </a:xfrm>
+            <a:prstGeom prst="leftBrace">
+              <a:avLst/>
+            </a:prstGeom>
+            <a:ln>
+              <a:solidFill>
+                <a:schemeClr val="tx1"/>
+              </a:solidFill>
+            </a:ln>
+          </p:spPr>
+          <p:style>
+            <a:lnRef idx="1">
+              <a:schemeClr val="accent1"/>
+            </a:lnRef>
+            <a:fillRef idx="0">
+              <a:schemeClr val="accent1"/>
+            </a:fillRef>
+            <a:effectRef idx="0">
+              <a:schemeClr val="accent1"/>
+            </a:effectRef>
+            <a:fontRef idx="minor">
+              <a:schemeClr val="tx1"/>
+            </a:fontRef>
+          </p:style>
+          <p:txBody>
+            <a:bodyPr rtlCol="0" anchor="ctr"/>
+            <a:lstStyle/>
+            <a:p>
+              <a:pPr algn="ctr"/>
+              <a:endParaRPr lang="en-US"/>
+            </a:p>
+          </p:txBody>
+        </p:sp>
+        <p:sp>
+          <p:nvSpPr>
+            <p:cNvPr id="11" name="TextBox 10"/>
+            <p:cNvSpPr txBox="1"/>
+            <p:nvPr/>
+          </p:nvSpPr>
+          <p:spPr>
+            <a:xfrm>
+              <a:off x="4332402" y="3202899"/>
+              <a:ext cx="646331" cy="369332"/>
+            </a:xfrm>
+            <a:prstGeom prst="rect">
+              <a:avLst/>
+            </a:prstGeom>
+            <a:noFill/>
+          </p:spPr>
+          <p:txBody>
+            <a:bodyPr wrap="none" rtlCol="0">
+              <a:spAutoFit/>
+            </a:bodyPr>
+            <a:lstStyle/>
+            <a:p>
+              <a:r>
+                <a:rPr lang="ja-JP" altLang="en-US" dirty="0" smtClean="0">
+                  <a:latin typeface="MS Mincho" charset="-128"/>
+                  <a:ea typeface="MS Mincho" charset="-128"/>
+                  <a:cs typeface="MS Mincho" charset="-128"/>
+                </a:rPr>
+                <a:t>速度</a:t>
+              </a:r>
+              <a:endParaRPr lang="en-US" altLang="ja-JP" dirty="0" smtClean="0">
+                <a:latin typeface="MS Mincho" charset="-128"/>
+                <a:ea typeface="MS Mincho" charset="-128"/>
+                <a:cs typeface="MS Mincho" charset="-128"/>
+              </a:endParaRPr>
+            </a:p>
+          </p:txBody>
+        </p:sp>
+      </p:grpSp>
+      <p:grpSp>
+        <p:nvGrpSpPr>
+          <p:cNvPr id="14" name="Group 13"/>
+          <p:cNvGrpSpPr/>
+          <p:nvPr/>
+        </p:nvGrpSpPr>
+        <p:grpSpPr>
+          <a:xfrm>
+            <a:off x="2851383" y="4398176"/>
+            <a:ext cx="5743176" cy="1417973"/>
+            <a:chOff x="4332401" y="4430662"/>
+            <a:chExt cx="5743176" cy="1417973"/>
+          </a:xfrm>
+        </p:grpSpPr>
+        <mc:AlternateContent xmlns:mc="http://schemas.openxmlformats.org/markup-compatibility/2006" xmlns:a14="http://schemas.microsoft.com/office/drawing/2010/main">
+          <mc:Choice Requires="a14">
+            <p:sp>
+              <p:nvSpPr>
+                <p:cNvPr id="7" name="TextBox 6"/>
+                <p:cNvSpPr txBox="1"/>
+                <p:nvPr/>
+              </p:nvSpPr>
+              <p:spPr>
+                <a:xfrm>
+                  <a:off x="5530422" y="4430662"/>
+                  <a:ext cx="4112344" cy="474297"/>
+                </a:xfrm>
+                <a:prstGeom prst="rect">
+                  <a:avLst/>
+                </a:prstGeom>
+                <a:noFill/>
+              </p:spPr>
+              <p:txBody>
+                <a:bodyPr wrap="none" lIns="0" tIns="0" rIns="0" bIns="0" rtlCol="0">
+                  <a:spAutoFit/>
+                </a:bodyPr>
+                <a:lstStyle/>
+                <a:p>
+                  <a:pPr/>
+                  <a14:m>
+                    <m:oMathPara xmlns:m="http://schemas.openxmlformats.org/officeDocument/2006/math">
+                      <m:oMathParaPr>
+                        <m:jc m:val="centerGroup"/>
+                      </m:oMathParaPr>
+                      <m:oMath xmlns:m="http://schemas.openxmlformats.org/officeDocument/2006/math">
+                        <m:r>
+                          <a:rPr lang="en-US" b="0" i="1" smtClean="0">
+                            <a:latin typeface="Cambria Math" charset="0"/>
+                          </a:rPr>
+                          <m:t>𝑥</m:t>
+                        </m:r>
+                        <m:d>
+                          <m:dPr>
+                            <m:ctrlPr>
+                              <a:rPr lang="en-US" b="0" i="1" smtClean="0">
+                                <a:latin typeface="Cambria Math" charset="0"/>
+                              </a:rPr>
+                            </m:ctrlPr>
+                          </m:dPr>
+                          <m:e>
+                            <m:r>
+                              <a:rPr lang="en-US" b="0" i="1" smtClean="0">
+                                <a:latin typeface="Cambria Math" charset="0"/>
+                              </a:rPr>
+                              <m:t>𝑡</m:t>
+                            </m:r>
+                            <m:r>
+                              <a:rPr lang="en-US" b="0" i="1" smtClean="0">
+                                <a:latin typeface="Cambria Math" charset="0"/>
+                              </a:rPr>
+                              <m:t>+∆</m:t>
+                            </m:r>
+                            <m:r>
+                              <a:rPr lang="en-US" b="0" i="1" smtClean="0">
+                                <a:latin typeface="Cambria Math" charset="0"/>
+                                <a:ea typeface="Cambria Math" charset="0"/>
+                                <a:cs typeface="Cambria Math" charset="0"/>
+                              </a:rPr>
+                              <m:t>𝑡</m:t>
+                            </m:r>
+                          </m:e>
+                        </m:d>
+                        <m:r>
+                          <a:rPr lang="en-US" b="0" i="1" smtClean="0">
+                            <a:latin typeface="Cambria Math" charset="0"/>
+                            <a:ea typeface="Cambria Math" charset="0"/>
+                            <a:cs typeface="Cambria Math" charset="0"/>
+                          </a:rPr>
+                          <m:t>=</m:t>
+                        </m:r>
+                        <m:r>
+                          <a:rPr lang="en-US" b="0" i="1" smtClean="0">
+                            <a:latin typeface="Cambria Math" charset="0"/>
+                            <a:ea typeface="Cambria Math" charset="0"/>
+                            <a:cs typeface="Cambria Math" charset="0"/>
+                          </a:rPr>
+                          <m:t>𝑥</m:t>
+                        </m:r>
+                        <m:d>
+                          <m:dPr>
+                            <m:ctrlPr>
+                              <a:rPr lang="en-US" b="0" i="1" smtClean="0">
+                                <a:latin typeface="Cambria Math" charset="0"/>
+                                <a:ea typeface="Cambria Math" charset="0"/>
+                                <a:cs typeface="Cambria Math" charset="0"/>
+                              </a:rPr>
+                            </m:ctrlPr>
+                          </m:dPr>
+                          <m:e>
+                            <m:r>
+                              <a:rPr lang="en-US" b="0" i="1" smtClean="0">
+                                <a:latin typeface="Cambria Math" charset="0"/>
+                                <a:ea typeface="Cambria Math" charset="0"/>
+                                <a:cs typeface="Cambria Math" charset="0"/>
+                              </a:rPr>
+                              <m:t>𝑡</m:t>
+                            </m:r>
+                          </m:e>
+                        </m:d>
+                        <m:r>
+                          <a:rPr lang="en-US" b="0" i="1" smtClean="0">
+                            <a:latin typeface="Cambria Math" charset="0"/>
+                            <a:ea typeface="Cambria Math" charset="0"/>
+                            <a:cs typeface="Cambria Math" charset="0"/>
+                          </a:rPr>
+                          <m:t>+</m:t>
+                        </m:r>
+                        <m:d>
+                          <m:dPr>
+                            <m:ctrlPr>
+                              <a:rPr lang="mr-IN" b="0" i="1" smtClean="0">
+                                <a:latin typeface="Cambria Math" charset="0"/>
+                                <a:ea typeface="Cambria Math" charset="0"/>
+                                <a:cs typeface="Cambria Math" charset="0"/>
+                              </a:rPr>
+                            </m:ctrlPr>
+                          </m:dPr>
+                          <m:e>
+                            <m:r>
+                              <a:rPr lang="mr-IN" b="0" i="1" smtClean="0">
+                                <a:latin typeface="Cambria Math" charset="0"/>
+                                <a:ea typeface="Cambria Math" charset="0"/>
+                                <a:cs typeface="Cambria Math" charset="0"/>
+                              </a:rPr>
+                              <m:t>∆</m:t>
+                            </m:r>
+                            <m:r>
+                              <a:rPr lang="en-US" b="0" i="1" smtClean="0">
+                                <a:latin typeface="Cambria Math" charset="0"/>
+                                <a:ea typeface="Cambria Math" charset="0"/>
+                                <a:cs typeface="Cambria Math" charset="0"/>
+                              </a:rPr>
+                              <m:t>𝑡</m:t>
+                            </m:r>
+                            <m:r>
+                              <a:rPr lang="en-US" b="0" i="1" smtClean="0">
+                                <a:latin typeface="Cambria Math" charset="0"/>
+                                <a:ea typeface="Cambria Math" charset="0"/>
+                                <a:cs typeface="Cambria Math" charset="0"/>
+                              </a:rPr>
+                              <m:t>−</m:t>
+                            </m:r>
+                            <m:f>
+                              <m:fPr>
+                                <m:ctrlPr>
+                                  <a:rPr lang="mr-IN" b="0" i="1" smtClean="0">
+                                    <a:latin typeface="Cambria Math" charset="0"/>
+                                    <a:ea typeface="Cambria Math" charset="0"/>
+                                    <a:cs typeface="Cambria Math" charset="0"/>
+                                  </a:rPr>
+                                </m:ctrlPr>
+                              </m:fPr>
+                              <m:num>
+                                <m:r>
+                                  <a:rPr lang="mr-IN" b="0" i="1" smtClean="0">
+                                    <a:latin typeface="Cambria Math" charset="0"/>
+                                    <a:ea typeface="Cambria Math" charset="0"/>
+                                    <a:cs typeface="Cambria Math" charset="0"/>
+                                  </a:rPr>
+                                  <m:t>𝛾</m:t>
+                                </m:r>
+                              </m:num>
+                              <m:den>
+                                <m:r>
+                                  <a:rPr lang="en-US" b="0" i="1" smtClean="0">
+                                    <a:latin typeface="Cambria Math" charset="0"/>
+                                    <a:ea typeface="Cambria Math" charset="0"/>
+                                    <a:cs typeface="Cambria Math" charset="0"/>
+                                  </a:rPr>
+                                  <m:t>2</m:t>
+                                </m:r>
+                                <m:r>
+                                  <a:rPr lang="en-US" b="0" i="1" smtClean="0">
+                                    <a:latin typeface="Cambria Math" charset="0"/>
+                                    <a:ea typeface="Cambria Math" charset="0"/>
+                                    <a:cs typeface="Cambria Math" charset="0"/>
+                                  </a:rPr>
+                                  <m:t>𝑚</m:t>
+                                </m:r>
+                              </m:den>
+                            </m:f>
+                            <m:sSup>
+                              <m:sSupPr>
+                                <m:ctrlPr>
+                                  <a:rPr lang="mr-IN" b="0" i="1" smtClean="0">
+                                    <a:latin typeface="Cambria Math" charset="0"/>
+                                    <a:ea typeface="Cambria Math" charset="0"/>
+                                    <a:cs typeface="Cambria Math" charset="0"/>
+                                  </a:rPr>
+                                </m:ctrlPr>
+                              </m:sSupPr>
+                              <m:e>
+                                <m:r>
+                                  <a:rPr lang="mr-IN" b="0" i="1" smtClean="0">
+                                    <a:latin typeface="Cambria Math" charset="0"/>
+                                    <a:ea typeface="Cambria Math" charset="0"/>
+                                    <a:cs typeface="Cambria Math" charset="0"/>
+                                  </a:rPr>
+                                  <m:t>∆</m:t>
+                                </m:r>
+                                <m:r>
+                                  <a:rPr lang="en-US" b="0" i="1" smtClean="0">
+                                    <a:latin typeface="Cambria Math" charset="0"/>
+                                    <a:ea typeface="Cambria Math" charset="0"/>
+                                    <a:cs typeface="Cambria Math" charset="0"/>
+                                  </a:rPr>
+                                  <m:t>𝑡</m:t>
+                                </m:r>
+                              </m:e>
+                              <m:sup>
+                                <m:r>
+                                  <a:rPr lang="en-US" b="0" i="1" smtClean="0">
+                                    <a:latin typeface="Cambria Math" charset="0"/>
+                                    <a:ea typeface="Cambria Math" charset="0"/>
+                                    <a:cs typeface="Cambria Math" charset="0"/>
+                                  </a:rPr>
+                                  <m:t>2</m:t>
+                                </m:r>
+                              </m:sup>
+                            </m:sSup>
+                          </m:e>
+                        </m:d>
+                        <m:r>
+                          <a:rPr lang="mr-IN" b="0" i="1" smtClean="0">
+                            <a:latin typeface="Cambria Math" charset="0"/>
+                            <a:ea typeface="Cambria Math" charset="0"/>
+                            <a:cs typeface="Cambria Math" charset="0"/>
+                          </a:rPr>
+                          <m:t>∙</m:t>
+                        </m:r>
+                        <m:sSub>
+                          <m:sSubPr>
+                            <m:ctrlPr>
+                              <a:rPr lang="en-US" b="0" i="1" smtClean="0">
+                                <a:latin typeface="Cambria Math" charset="0"/>
+                                <a:ea typeface="Cambria Math" charset="0"/>
+                                <a:cs typeface="Cambria Math" charset="0"/>
+                              </a:rPr>
+                            </m:ctrlPr>
+                          </m:sSubPr>
+                          <m:e>
+                            <m:r>
+                              <a:rPr lang="en-US" b="0" i="1" smtClean="0">
+                                <a:latin typeface="Cambria Math" charset="0"/>
+                                <a:ea typeface="Cambria Math" charset="0"/>
+                                <a:cs typeface="Cambria Math" charset="0"/>
+                              </a:rPr>
+                              <m:t>𝑣</m:t>
+                            </m:r>
+                          </m:e>
+                          <m:sub>
+                            <m:r>
+                              <a:rPr lang="en-US" b="0" i="1" smtClean="0">
+                                <a:latin typeface="Cambria Math" charset="0"/>
+                                <a:ea typeface="Cambria Math" charset="0"/>
+                                <a:cs typeface="Cambria Math" charset="0"/>
+                              </a:rPr>
+                              <m:t>𝑥</m:t>
+                            </m:r>
+                          </m:sub>
+                        </m:sSub>
+                        <m:r>
+                          <a:rPr lang="en-US" b="0" i="1" smtClean="0">
+                            <a:latin typeface="Cambria Math" charset="0"/>
+                            <a:ea typeface="Cambria Math" charset="0"/>
+                            <a:cs typeface="Cambria Math" charset="0"/>
+                          </a:rPr>
+                          <m:t>(</m:t>
+                        </m:r>
+                        <m:r>
+                          <a:rPr lang="en-US" b="0" i="1" smtClean="0">
+                            <a:latin typeface="Cambria Math" charset="0"/>
+                            <a:ea typeface="Cambria Math" charset="0"/>
+                            <a:cs typeface="Cambria Math" charset="0"/>
+                          </a:rPr>
+                          <m:t>𝑡</m:t>
+                        </m:r>
+                        <m:r>
+                          <a:rPr lang="en-US" b="0" i="1" smtClean="0">
+                            <a:latin typeface="Cambria Math" charset="0"/>
+                            <a:ea typeface="Cambria Math" charset="0"/>
+                            <a:cs typeface="Cambria Math" charset="0"/>
+                          </a:rPr>
+                          <m:t>)</m:t>
+                        </m:r>
+                      </m:oMath>
+                    </m:oMathPara>
+                  </a14:m>
+                  <a:endParaRPr lang="en-US" dirty="0"/>
+                </a:p>
+              </p:txBody>
+            </p:sp>
+          </mc:Choice>
+          <mc:Fallback xmlns="">
+            <p:sp>
+              <p:nvSpPr>
+                <p:cNvPr id="7" name="TextBox 6"/>
+                <p:cNvSpPr txBox="1">
+                  <a:spLocks noRot="1" noChangeAspect="1" noMove="1" noResize="1" noEditPoints="1" noAdjustHandles="1" noChangeArrowheads="1" noChangeShapeType="1" noTextEdit="1"/>
+                </p:cNvSpPr>
+                <p:nvPr/>
+              </p:nvSpPr>
+              <p:spPr>
+                <a:xfrm>
+                  <a:off x="5530422" y="4430662"/>
+                  <a:ext cx="4112344" cy="474297"/>
+                </a:xfrm>
+                <a:prstGeom prst="rect">
+                  <a:avLst/>
+                </a:prstGeom>
+                <a:blipFill rotWithShape="0">
+                  <a:blip r:embed="rId4"/>
+                  <a:stretch>
+                    <a:fillRect/>
+                  </a:stretch>
+                </a:blipFill>
+              </p:spPr>
+              <p:txBody>
+                <a:bodyPr/>
+                <a:lstStyle/>
+                <a:p>
+                  <a:r>
+                    <a:rPr lang="en-US">
+                      <a:noFill/>
+                    </a:rPr>
+                    <a:t> </a:t>
+                  </a:r>
+                </a:p>
+              </p:txBody>
+            </p:sp>
+          </mc:Fallback>
+        </mc:AlternateContent>
+        <mc:AlternateContent xmlns:mc="http://schemas.openxmlformats.org/markup-compatibility/2006" xmlns:a14="http://schemas.microsoft.com/office/drawing/2010/main">
+          <mc:Choice Requires="a14">
+            <p:sp>
+              <p:nvSpPr>
+                <p:cNvPr id="8" name="TextBox 7"/>
+                <p:cNvSpPr txBox="1"/>
+                <p:nvPr/>
+              </p:nvSpPr>
+              <p:spPr>
+                <a:xfrm>
+                  <a:off x="5530422" y="5275497"/>
+                  <a:ext cx="4545155" cy="509050"/>
+                </a:xfrm>
+                <a:prstGeom prst="rect">
+                  <a:avLst/>
+                </a:prstGeom>
+                <a:noFill/>
+              </p:spPr>
+              <p:txBody>
+                <a:bodyPr wrap="none" lIns="0" tIns="0" rIns="0" bIns="0" rtlCol="0">
+                  <a:spAutoFit/>
+                </a:bodyPr>
+                <a:lstStyle/>
+                <a:p>
+                  <a:pPr/>
+                  <a14:m>
+                    <m:oMathPara xmlns:m="http://schemas.openxmlformats.org/officeDocument/2006/math">
+                      <m:oMathParaPr>
+                        <m:jc m:val="centerGroup"/>
+                      </m:oMathParaPr>
+                      <m:oMath xmlns:m="http://schemas.openxmlformats.org/officeDocument/2006/math">
+                        <m:r>
+                          <a:rPr lang="en-US" b="0" i="1" smtClean="0">
+                            <a:latin typeface="Cambria Math" charset="0"/>
+                          </a:rPr>
+                          <m:t>𝑦</m:t>
+                        </m:r>
+                        <m:d>
+                          <m:dPr>
+                            <m:ctrlPr>
+                              <a:rPr lang="en-US" b="0" i="1" smtClean="0">
+                                <a:latin typeface="Cambria Math" charset="0"/>
+                              </a:rPr>
+                            </m:ctrlPr>
+                          </m:dPr>
+                          <m:e>
+                            <m:r>
+                              <a:rPr lang="en-US" b="0" i="1" smtClean="0">
+                                <a:latin typeface="Cambria Math" charset="0"/>
+                              </a:rPr>
+                              <m:t>𝑡</m:t>
+                            </m:r>
+                            <m:r>
+                              <a:rPr lang="en-US" b="0" i="1" smtClean="0">
+                                <a:latin typeface="Cambria Math" charset="0"/>
+                              </a:rPr>
+                              <m:t>+∆</m:t>
+                            </m:r>
+                            <m:r>
+                              <a:rPr lang="en-US" b="0" i="1" smtClean="0">
+                                <a:latin typeface="Cambria Math" charset="0"/>
+                                <a:ea typeface="Cambria Math" charset="0"/>
+                                <a:cs typeface="Cambria Math" charset="0"/>
+                              </a:rPr>
+                              <m:t>𝑡</m:t>
+                            </m:r>
+                          </m:e>
+                        </m:d>
+                        <m:r>
+                          <a:rPr lang="en-US" b="0" i="1" smtClean="0">
+                            <a:latin typeface="Cambria Math" charset="0"/>
+                            <a:ea typeface="Cambria Math" charset="0"/>
+                            <a:cs typeface="Cambria Math" charset="0"/>
+                          </a:rPr>
+                          <m:t>=</m:t>
+                        </m:r>
+                        <m:r>
+                          <a:rPr lang="en-US" b="0" i="1" smtClean="0">
+                            <a:latin typeface="Cambria Math" charset="0"/>
+                            <a:ea typeface="Cambria Math" charset="0"/>
+                            <a:cs typeface="Cambria Math" charset="0"/>
+                          </a:rPr>
+                          <m:t>𝑦</m:t>
+                        </m:r>
+                        <m:d>
+                          <m:dPr>
+                            <m:ctrlPr>
+                              <a:rPr lang="en-US" b="0" i="1" smtClean="0">
+                                <a:latin typeface="Cambria Math" charset="0"/>
+                                <a:ea typeface="Cambria Math" charset="0"/>
+                                <a:cs typeface="Cambria Math" charset="0"/>
+                              </a:rPr>
+                            </m:ctrlPr>
+                          </m:dPr>
+                          <m:e>
+                            <m:r>
+                              <a:rPr lang="en-US" b="0" i="1" smtClean="0">
+                                <a:latin typeface="Cambria Math" charset="0"/>
+                                <a:ea typeface="Cambria Math" charset="0"/>
+                                <a:cs typeface="Cambria Math" charset="0"/>
+                              </a:rPr>
+                              <m:t>𝑡</m:t>
+                            </m:r>
+                          </m:e>
+                        </m:d>
+                        <m:r>
+                          <a:rPr lang="en-US" b="0" i="1" smtClean="0">
+                            <a:latin typeface="Cambria Math" charset="0"/>
+                            <a:ea typeface="Cambria Math" charset="0"/>
+                            <a:cs typeface="Cambria Math" charset="0"/>
+                          </a:rPr>
+                          <m:t>+</m:t>
+                        </m:r>
+                        <m:d>
+                          <m:dPr>
+                            <m:ctrlPr>
+                              <a:rPr lang="mr-IN" b="0" i="1" smtClean="0">
+                                <a:latin typeface="Cambria Math" charset="0"/>
+                                <a:ea typeface="Cambria Math" charset="0"/>
+                                <a:cs typeface="Cambria Math" charset="0"/>
+                              </a:rPr>
+                            </m:ctrlPr>
+                          </m:dPr>
+                          <m:e>
+                            <m:r>
+                              <a:rPr lang="mr-IN" b="0" i="1" smtClean="0">
+                                <a:latin typeface="Cambria Math" charset="0"/>
+                                <a:ea typeface="Cambria Math" charset="0"/>
+                                <a:cs typeface="Cambria Math" charset="0"/>
+                              </a:rPr>
+                              <m:t>∆</m:t>
+                            </m:r>
+                            <m:r>
+                              <a:rPr lang="en-US" b="0" i="1" smtClean="0">
+                                <a:latin typeface="Cambria Math" charset="0"/>
+                                <a:ea typeface="Cambria Math" charset="0"/>
+                                <a:cs typeface="Cambria Math" charset="0"/>
+                              </a:rPr>
+                              <m:t>𝑡</m:t>
+                            </m:r>
+                            <m:r>
+                              <a:rPr lang="en-US" b="0" i="1" smtClean="0">
+                                <a:latin typeface="Cambria Math" charset="0"/>
+                                <a:ea typeface="Cambria Math" charset="0"/>
+                                <a:cs typeface="Cambria Math" charset="0"/>
+                              </a:rPr>
+                              <m:t>−</m:t>
+                            </m:r>
+                            <m:f>
+                              <m:fPr>
+                                <m:ctrlPr>
+                                  <a:rPr lang="mr-IN" b="0" i="1" smtClean="0">
+                                    <a:latin typeface="Cambria Math" charset="0"/>
+                                    <a:ea typeface="Cambria Math" charset="0"/>
+                                    <a:cs typeface="Cambria Math" charset="0"/>
+                                  </a:rPr>
+                                </m:ctrlPr>
+                              </m:fPr>
+                              <m:num>
+                                <m:r>
+                                  <a:rPr lang="en-US" b="0" i="1" smtClean="0">
+                                    <a:latin typeface="Cambria Math" charset="0"/>
+                                    <a:ea typeface="Cambria Math" charset="0"/>
+                                    <a:cs typeface="Cambria Math" charset="0"/>
+                                  </a:rPr>
+                                  <m:t>𝑚𝑔</m:t>
+                                </m:r>
+                                <m:r>
+                                  <a:rPr lang="en-US" b="0" i="1" smtClean="0">
+                                    <a:latin typeface="Cambria Math" charset="0"/>
+                                    <a:ea typeface="Cambria Math" charset="0"/>
+                                    <a:cs typeface="Cambria Math" charset="0"/>
+                                  </a:rPr>
+                                  <m:t>+</m:t>
+                                </m:r>
+                                <m:r>
+                                  <a:rPr lang="mr-IN" b="0" i="1" smtClean="0">
+                                    <a:latin typeface="Cambria Math" charset="0"/>
+                                    <a:ea typeface="Cambria Math" charset="0"/>
+                                    <a:cs typeface="Cambria Math" charset="0"/>
+                                  </a:rPr>
+                                  <m:t>𝛾</m:t>
+                                </m:r>
+                              </m:num>
+                              <m:den>
+                                <m:r>
+                                  <a:rPr lang="en-US" b="0" i="1" smtClean="0">
+                                    <a:latin typeface="Cambria Math" charset="0"/>
+                                    <a:ea typeface="Cambria Math" charset="0"/>
+                                    <a:cs typeface="Cambria Math" charset="0"/>
+                                  </a:rPr>
+                                  <m:t>2</m:t>
+                                </m:r>
+                                <m:r>
+                                  <a:rPr lang="en-US" b="0" i="1" smtClean="0">
+                                    <a:latin typeface="Cambria Math" charset="0"/>
+                                    <a:ea typeface="Cambria Math" charset="0"/>
+                                    <a:cs typeface="Cambria Math" charset="0"/>
+                                  </a:rPr>
+                                  <m:t>𝑚</m:t>
+                                </m:r>
+                              </m:den>
+                            </m:f>
+                            <m:sSup>
+                              <m:sSupPr>
+                                <m:ctrlPr>
+                                  <a:rPr lang="mr-IN" b="0" i="1" smtClean="0">
+                                    <a:latin typeface="Cambria Math" charset="0"/>
+                                    <a:ea typeface="Cambria Math" charset="0"/>
+                                    <a:cs typeface="Cambria Math" charset="0"/>
+                                  </a:rPr>
+                                </m:ctrlPr>
+                              </m:sSupPr>
+                              <m:e>
+                                <m:r>
+                                  <a:rPr lang="mr-IN" b="0" i="1" smtClean="0">
+                                    <a:latin typeface="Cambria Math" charset="0"/>
+                                    <a:ea typeface="Cambria Math" charset="0"/>
+                                    <a:cs typeface="Cambria Math" charset="0"/>
+                                  </a:rPr>
+                                  <m:t>∆</m:t>
+                                </m:r>
+                                <m:r>
+                                  <a:rPr lang="en-US" b="0" i="1" smtClean="0">
+                                    <a:latin typeface="Cambria Math" charset="0"/>
+                                    <a:ea typeface="Cambria Math" charset="0"/>
+                                    <a:cs typeface="Cambria Math" charset="0"/>
+                                  </a:rPr>
+                                  <m:t>𝑡</m:t>
+                                </m:r>
+                              </m:e>
+                              <m:sup>
+                                <m:r>
+                                  <a:rPr lang="en-US" b="0" i="1" smtClean="0">
+                                    <a:latin typeface="Cambria Math" charset="0"/>
+                                    <a:ea typeface="Cambria Math" charset="0"/>
+                                    <a:cs typeface="Cambria Math" charset="0"/>
+                                  </a:rPr>
+                                  <m:t>2</m:t>
+                                </m:r>
+                              </m:sup>
+                            </m:sSup>
+                          </m:e>
+                        </m:d>
+                        <m:r>
+                          <a:rPr lang="mr-IN" b="0" i="1" smtClean="0">
+                            <a:latin typeface="Cambria Math" charset="0"/>
+                            <a:ea typeface="Cambria Math" charset="0"/>
+                            <a:cs typeface="Cambria Math" charset="0"/>
+                          </a:rPr>
+                          <m:t>∙</m:t>
+                        </m:r>
+                        <m:sSub>
+                          <m:sSubPr>
+                            <m:ctrlPr>
+                              <a:rPr lang="en-US" b="0" i="1" smtClean="0">
+                                <a:latin typeface="Cambria Math" charset="0"/>
+                                <a:ea typeface="Cambria Math" charset="0"/>
+                                <a:cs typeface="Cambria Math" charset="0"/>
+                              </a:rPr>
+                            </m:ctrlPr>
+                          </m:sSubPr>
+                          <m:e>
+                            <m:r>
+                              <a:rPr lang="en-US" b="0" i="1" smtClean="0">
+                                <a:latin typeface="Cambria Math" charset="0"/>
+                                <a:ea typeface="Cambria Math" charset="0"/>
+                                <a:cs typeface="Cambria Math" charset="0"/>
+                              </a:rPr>
+                              <m:t>𝑣</m:t>
+                            </m:r>
+                          </m:e>
+                          <m:sub>
+                            <m:r>
+                              <a:rPr lang="en-US" b="0" i="1" smtClean="0">
+                                <a:latin typeface="Cambria Math" charset="0"/>
+                                <a:ea typeface="Cambria Math" charset="0"/>
+                                <a:cs typeface="Cambria Math" charset="0"/>
+                              </a:rPr>
+                              <m:t>𝑦</m:t>
+                            </m:r>
+                          </m:sub>
+                        </m:sSub>
+                        <m:r>
+                          <a:rPr lang="en-US" b="0" i="1" smtClean="0">
+                            <a:latin typeface="Cambria Math" charset="0"/>
+                            <a:ea typeface="Cambria Math" charset="0"/>
+                            <a:cs typeface="Cambria Math" charset="0"/>
+                          </a:rPr>
+                          <m:t>(</m:t>
+                        </m:r>
+                        <m:r>
+                          <a:rPr lang="en-US" b="0" i="1" smtClean="0">
+                            <a:latin typeface="Cambria Math" charset="0"/>
+                            <a:ea typeface="Cambria Math" charset="0"/>
+                            <a:cs typeface="Cambria Math" charset="0"/>
+                          </a:rPr>
+                          <m:t>𝑡</m:t>
+                        </m:r>
+                        <m:r>
+                          <a:rPr lang="en-US" b="0" i="1" smtClean="0">
+                            <a:latin typeface="Cambria Math" charset="0"/>
+                            <a:ea typeface="Cambria Math" charset="0"/>
+                            <a:cs typeface="Cambria Math" charset="0"/>
+                          </a:rPr>
+                          <m:t>)</m:t>
+                        </m:r>
+                      </m:oMath>
+                    </m:oMathPara>
+                  </a14:m>
+                  <a:endParaRPr lang="en-US" dirty="0"/>
+                </a:p>
+              </p:txBody>
+            </p:sp>
+          </mc:Choice>
+          <mc:Fallback xmlns="">
+            <p:sp>
+              <p:nvSpPr>
+                <p:cNvPr id="8" name="TextBox 7"/>
+                <p:cNvSpPr txBox="1">
+                  <a:spLocks noRot="1" noChangeAspect="1" noMove="1" noResize="1" noEditPoints="1" noAdjustHandles="1" noChangeArrowheads="1" noChangeShapeType="1" noTextEdit="1"/>
+                </p:cNvSpPr>
+                <p:nvPr/>
+              </p:nvSpPr>
+              <p:spPr>
+                <a:xfrm>
+                  <a:off x="5530422" y="5275497"/>
+                  <a:ext cx="4545155" cy="509050"/>
+                </a:xfrm>
+                <a:prstGeom prst="rect">
+                  <a:avLst/>
+                </a:prstGeom>
+                <a:blipFill rotWithShape="0">
+                  <a:blip r:embed="rId5"/>
+                  <a:stretch>
+                    <a:fillRect/>
+                  </a:stretch>
+                </a:blipFill>
+              </p:spPr>
+              <p:txBody>
+                <a:bodyPr/>
+                <a:lstStyle/>
+                <a:p>
+                  <a:r>
+                    <a:rPr lang="en-US">
+                      <a:noFill/>
+                    </a:rPr>
+                    <a:t> </a:t>
+                  </a:r>
+                </a:p>
+              </p:txBody>
+            </p:sp>
+          </mc:Fallback>
+        </mc:AlternateContent>
+        <p:sp>
+          <p:nvSpPr>
+            <p:cNvPr id="10" name="Left Brace 9"/>
+            <p:cNvSpPr/>
+            <p:nvPr/>
+          </p:nvSpPr>
+          <p:spPr>
+            <a:xfrm>
+              <a:off x="5132229" y="4503518"/>
+              <a:ext cx="244699" cy="1345117"/>
+            </a:xfrm>
+            <a:prstGeom prst="leftBrace">
+              <a:avLst/>
+            </a:prstGeom>
+            <a:ln>
+              <a:solidFill>
+                <a:schemeClr val="tx1"/>
+              </a:solidFill>
+            </a:ln>
+          </p:spPr>
+          <p:style>
+            <a:lnRef idx="1">
+              <a:schemeClr val="accent1"/>
+            </a:lnRef>
+            <a:fillRef idx="0">
+              <a:schemeClr val="accent1"/>
+            </a:fillRef>
+            <a:effectRef idx="0">
+              <a:schemeClr val="accent1"/>
+            </a:effectRef>
+            <a:fontRef idx="minor">
+              <a:schemeClr val="tx1"/>
+            </a:fontRef>
+          </p:style>
+          <p:txBody>
+            <a:bodyPr rtlCol="0" anchor="ctr"/>
+            <a:lstStyle/>
+            <a:p>
+              <a:pPr algn="ctr"/>
+              <a:endParaRPr lang="en-US"/>
+            </a:p>
+          </p:txBody>
+        </p:sp>
+        <p:sp>
+          <p:nvSpPr>
+            <p:cNvPr id="12" name="TextBox 11"/>
+            <p:cNvSpPr txBox="1"/>
+            <p:nvPr/>
+          </p:nvSpPr>
+          <p:spPr>
+            <a:xfrm>
+              <a:off x="4332401" y="4906165"/>
+              <a:ext cx="646331" cy="369332"/>
+            </a:xfrm>
+            <a:prstGeom prst="rect">
+              <a:avLst/>
+            </a:prstGeom>
+            <a:noFill/>
+          </p:spPr>
+          <p:txBody>
+            <a:bodyPr wrap="none" rtlCol="0">
+              <a:spAutoFit/>
+            </a:bodyPr>
+            <a:lstStyle/>
+            <a:p>
+              <a:r>
+                <a:rPr lang="ja-JP" altLang="en-US" dirty="0">
+                  <a:latin typeface="MS Mincho" charset="-128"/>
+                  <a:ea typeface="MS Mincho" charset="-128"/>
+                  <a:cs typeface="MS Mincho" charset="-128"/>
+                </a:rPr>
+                <a:t>位置</a:t>
+              </a:r>
+              <a:endParaRPr lang="en-US" altLang="ja-JP" dirty="0" smtClean="0">
+                <a:latin typeface="MS Mincho" charset="-128"/>
+                <a:ea typeface="MS Mincho" charset="-128"/>
+                <a:cs typeface="MS Mincho" charset="-128"/>
+              </a:endParaRPr>
+            </a:p>
+          </p:txBody>
+        </p:sp>
+      </p:grpSp>
     </p:spTree>
     <p:extLst>
       <p:ext uri="{BB962C8B-B14F-4D97-AF65-F5344CB8AC3E}">
@@ -6534,7 +8676,7 @@
         <p:spPr>
           <a:xfrm>
             <a:off x="2506363" y="3309185"/>
-            <a:ext cx="4108817" cy="369332"/>
+            <a:ext cx="2723823" cy="369332"/>
           </a:xfrm>
           <a:prstGeom prst="rect">
             <a:avLst/>
@@ -6561,7 +8703,7 @@
                 <a:ea typeface="MS Mincho" charset="-128"/>
                 <a:cs typeface="MS Mincho" charset="-128"/>
               </a:rPr>
-              <a:t>球を打ち出す角度、球の初速度など</a:t>
+              <a:t>球を打ち出す角度など</a:t>
             </a:r>
             <a:r>
               <a:rPr lang="en-US" altLang="ja-JP" dirty="0" smtClean="0">
@@ -6846,7 +8988,7 @@
         <p:spPr>
           <a:xfrm>
             <a:off x="1097280" y="4272466"/>
-            <a:ext cx="4801314" cy="369332"/>
+            <a:ext cx="4339650" cy="369332"/>
           </a:xfrm>
           <a:prstGeom prst="rect">
             <a:avLst/>
@@ -6865,7 +9007,7 @@
                 <a:ea typeface="MS Mincho" charset="-128"/>
                 <a:cs typeface="MS Mincho" charset="-128"/>
               </a:rPr>
-              <a:t>・球技スポーツにおいて「球」の特性は重要</a:t>
+              <a:t>・球技スポーツでは「球」の特性が重要</a:t>
             </a:r>
             <a:endParaRPr lang="en-US" altLang="ja-JP" dirty="0" smtClean="0">
               <a:latin typeface="MS Mincho" charset="-128"/>
@@ -6883,8 +9025,8 @@
         </p:nvSpPr>
         <p:spPr>
           <a:xfrm>
-            <a:off x="2917909" y="5235747"/>
-            <a:ext cx="6417141" cy="369332"/>
+            <a:off x="3610406" y="5291199"/>
+            <a:ext cx="5032147" cy="369332"/>
           </a:xfrm>
           <a:prstGeom prst="rect">
             <a:avLst/>
@@ -6908,7 +9050,7 @@
                 <a:ea typeface="MS Mincho" charset="-128"/>
                 <a:cs typeface="MS Mincho" charset="-128"/>
               </a:rPr>
-              <a:t>形状が比較的複雑なバドミントン</a:t>
+              <a:t>バドミントン</a:t>
             </a:r>
             <a:r>
               <a:rPr lang="ja-JP" altLang="en-US" dirty="0">
@@ -6916,7 +9058,7 @@
                 <a:ea typeface="MS Mincho" charset="-128"/>
                 <a:cs typeface="MS Mincho" charset="-128"/>
               </a:rPr>
-              <a:t>のシャトルについて</a:t>
+              <a:t>のシャトルの特性について</a:t>
             </a:r>
             <a:r>
               <a:rPr lang="ja-JP" altLang="en-US" dirty="0" smtClean="0">
@@ -7171,7 +9313,7 @@
         <p:spPr>
           <a:xfrm>
             <a:off x="4811602" y="1898085"/>
-            <a:ext cx="3070071" cy="923330"/>
+            <a:ext cx="2839239" cy="646331"/>
           </a:xfrm>
           <a:prstGeom prst="rect">
             <a:avLst/>
@@ -7245,70 +9387,7 @@
                 <a:ea typeface="MS Mincho" charset="-128"/>
                 <a:cs typeface="MS Mincho" charset="-128"/>
               </a:rPr>
-              <a:t>速度</a:t>
-            </a:r>
-            <a:r>
-              <a:rPr lang="ja-JP" altLang="en-US">
-                <a:latin typeface="MS Mincho" charset="-128"/>
-                <a:ea typeface="MS Mincho" charset="-128"/>
-                <a:cs typeface="MS Mincho" charset="-128"/>
-              </a:rPr>
-              <a:t>ベルレ法を</a:t>
-            </a:r>
-            <a:r>
-              <a:rPr lang="ja-JP" altLang="en-US" smtClean="0">
-                <a:latin typeface="MS Mincho" charset="-128"/>
-                <a:ea typeface="MS Mincho" charset="-128"/>
-                <a:cs typeface="MS Mincho" charset="-128"/>
-              </a:rPr>
-              <a:t>用いて</a:t>
-            </a:r>
-            <a:endParaRPr lang="en-US" altLang="ja-JP" dirty="0" smtClean="0">
-              <a:latin typeface="MS Mincho" charset="-128"/>
-              <a:ea typeface="MS Mincho" charset="-128"/>
-              <a:cs typeface="MS Mincho" charset="-128"/>
-            </a:endParaRPr>
-          </a:p>
-          <a:p>
-            <a:r>
-              <a:rPr lang="en-US" altLang="ja-JP" dirty="0">
-                <a:latin typeface="MS Mincho" charset="-128"/>
-                <a:ea typeface="MS Mincho" charset="-128"/>
-                <a:cs typeface="MS Mincho" charset="-128"/>
-              </a:rPr>
-              <a:t> </a:t>
-            </a:r>
-            <a:r>
-              <a:rPr lang="en-US" altLang="ja-JP" dirty="0" smtClean="0">
-                <a:latin typeface="MS Mincho" charset="-128"/>
-                <a:ea typeface="MS Mincho" charset="-128"/>
-                <a:cs typeface="MS Mincho" charset="-128"/>
-              </a:rPr>
-              <a:t>  </a:t>
-            </a:r>
-            <a:r>
-              <a:rPr lang="ja-JP" altLang="en-US" smtClean="0">
-                <a:latin typeface="MS Mincho" charset="-128"/>
-                <a:ea typeface="MS Mincho" charset="-128"/>
-                <a:cs typeface="MS Mincho" charset="-128"/>
-              </a:rPr>
-              <a:t>シミュレーション</a:t>
-            </a:r>
-            <a:r>
-              <a:rPr lang="ja-JP" altLang="en-US">
-                <a:latin typeface="MS Mincho" charset="-128"/>
-                <a:ea typeface="MS Mincho" charset="-128"/>
-                <a:cs typeface="MS Mincho" charset="-128"/>
-              </a:rPr>
-              <a:t>を</a:t>
-            </a:r>
-            <a:r>
-              <a:rPr lang="ja-JP" altLang="en-US" smtClean="0">
-                <a:latin typeface="MS Mincho" charset="-128"/>
-                <a:ea typeface="MS Mincho" charset="-128"/>
-                <a:cs typeface="MS Mincho" charset="-128"/>
-              </a:rPr>
-              <a:t>する</a:t>
+              <a:t>シミュレーションする</a:t>
             </a:r>
             <a:endParaRPr lang="en-US" altLang="ja-JP" dirty="0">
               <a:latin typeface="MS Mincho" charset="-128"/>
@@ -7401,7 +9480,7 @@
                 <a:ea typeface="MS Mincho" charset="-128"/>
                 <a:cs typeface="MS Mincho" charset="-128"/>
               </a:rPr>
-              <a:t>とを比較し、</a:t>
+              <a:t>を比較し、</a:t>
             </a:r>
             <a:endParaRPr lang="en-US" altLang="ja-JP" dirty="0" smtClean="0">
               <a:latin typeface="MS Mincho" charset="-128"/>
@@ -7432,7 +9511,7 @@
                 <a:ea typeface="MS Mincho" charset="-128"/>
                 <a:cs typeface="MS Mincho" charset="-128"/>
               </a:rPr>
-              <a:t>空気抵抗特性を決める</a:t>
+              <a:t>空気抵抗特性を求める</a:t>
             </a:r>
             <a:endParaRPr lang="en-US" dirty="0"/>
           </a:p>
@@ -7724,7 +9803,7 @@
           <p:nvPr/>
         </p:nvPicPr>
         <p:blipFill>
-          <a:blip r:embed="rId2">
+          <a:blip r:embed="rId3">
             <a:extLst>
               <a:ext uri="{28A0092B-C50C-407E-A947-70E740481C1C}">
                 <a14:useLocalDpi xmlns:a14="http://schemas.microsoft.com/office/drawing/2010/main" val="0"/>
@@ -7754,7 +9833,7 @@
           <p:nvPr/>
         </p:nvPicPr>
         <p:blipFill>
-          <a:blip r:embed="rId3">
+          <a:blip r:embed="rId4">
             <a:extLst>
               <a:ext uri="{28A0092B-C50C-407E-A947-70E740481C1C}">
                 <a14:useLocalDpi xmlns:a14="http://schemas.microsoft.com/office/drawing/2010/main" val="0"/>
@@ -7962,7 +10041,7 @@
           <p:nvPr/>
         </p:nvPicPr>
         <p:blipFill>
-          <a:blip r:embed="rId4">
+          <a:blip r:embed="rId5">
             <a:extLst>
               <a:ext uri="{28A0092B-C50C-407E-A947-70E740481C1C}">
                 <a14:useLocalDpi xmlns:a14="http://schemas.microsoft.com/office/drawing/2010/main" val="0"/>
@@ -8396,11 +10475,7 @@
           <a:p>
             <a:r>
               <a:rPr lang="ja-JP" altLang="en-US" smtClean="0"/>
-              <a:t>シャトル</a:t>
-            </a:r>
-            <a:r>
-              <a:rPr lang="ja-JP" altLang="en-US" smtClean="0"/>
-              <a:t>検出手順</a:t>
+              <a:t>シャトル軌道検出手順</a:t>
             </a:r>
             <a:endParaRPr lang="en-US" dirty="0"/>
           </a:p>
@@ -8415,7 +10490,7 @@
         <p:spPr>
           <a:xfrm>
             <a:off x="1097280" y="1745541"/>
-            <a:ext cx="8610049" cy="1754326"/>
+            <a:ext cx="10456709" cy="1754326"/>
           </a:xfrm>
           <a:prstGeom prst="rect">
             <a:avLst/>
@@ -8479,15 +10554,7 @@
                 <a:ea typeface="MS Mincho" charset="-128"/>
                 <a:cs typeface="MS Mincho" charset="-128"/>
               </a:rPr>
-              <a:t>動体</a:t>
-            </a:r>
-            <a:r>
-              <a:rPr lang="ja-JP" altLang="en-US" smtClean="0">
-                <a:latin typeface="MS Mincho" charset="-128"/>
-                <a:ea typeface="MS Mincho" charset="-128"/>
-                <a:cs typeface="MS Mincho" charset="-128"/>
-              </a:rPr>
-              <a:t>検出</a:t>
+              <a:t>動体検出</a:t>
             </a:r>
             <a:endParaRPr lang="en-US" altLang="ja-JP" smtClean="0">
               <a:latin typeface="MS Mincho" charset="-128"/>
@@ -8525,6 +10592,30 @@
               </a:rPr>
               <a:t>を行い、各領域の重心座標と面積を取得</a:t>
             </a:r>
+            <a:r>
+              <a:rPr lang="en-US" altLang="ja-JP" smtClean="0">
+                <a:latin typeface="MS Mincho" charset="-128"/>
+                <a:ea typeface="MS Mincho" charset="-128"/>
+                <a:cs typeface="MS Mincho" charset="-128"/>
+              </a:rPr>
+              <a:t> (</a:t>
+            </a:r>
+            <a:r>
+              <a:rPr lang="ja-JP" altLang="en-US" smtClean="0">
+                <a:latin typeface="MS Mincho" charset="-128"/>
+                <a:ea typeface="MS Mincho" charset="-128"/>
+                <a:cs typeface="MS Mincho" charset="-128"/>
+              </a:rPr>
+              <a:t>面積値の小さいものはノイズとして除去</a:t>
+            </a:r>
+            <a:r>
+              <a:rPr lang="en-US" altLang="ja-JP" smtClean="0">
+                <a:latin typeface="MS Mincho" charset="-128"/>
+                <a:ea typeface="MS Mincho" charset="-128"/>
+                <a:cs typeface="MS Mincho" charset="-128"/>
+              </a:rPr>
+              <a:t>)</a:t>
+            </a:r>
             <a:endParaRPr lang="en-US" altLang="ja-JP" dirty="0">
               <a:latin typeface="MS Mincho" charset="-128"/>
               <a:ea typeface="MS Mincho" charset="-128"/>
@@ -8603,23 +10694,7 @@
                 <a:ea typeface="MS Mincho" charset="-128"/>
                 <a:cs typeface="MS Mincho" charset="-128"/>
               </a:rPr>
-              <a:t>④</a:t>
-            </a:r>
-            <a:r>
-              <a:rPr lang="ja-JP" altLang="en-US" smtClean="0">
-                <a:latin typeface="MS Mincho" charset="-128"/>
-                <a:ea typeface="MS Mincho" charset="-128"/>
-                <a:cs typeface="MS Mincho" charset="-128"/>
-              </a:rPr>
-              <a:t>　</a:t>
-            </a:r>
-            <a:r>
-              <a:rPr lang="ja-JP" altLang="en-US" smtClean="0">
-                <a:latin typeface="MS Mincho" charset="-128"/>
-                <a:ea typeface="MS Mincho" charset="-128"/>
-                <a:cs typeface="MS Mincho" charset="-128"/>
-              </a:rPr>
-              <a:t>検出点近傍について、</a:t>
+              <a:t>④　検出点近傍について、</a:t>
             </a:r>
             <a:r>
               <a:rPr lang="en-US" altLang="ja-JP" smtClean="0">
@@ -8678,7 +10753,7 @@
           <p:nvPr/>
         </p:nvPicPr>
         <p:blipFill>
-          <a:blip r:embed="rId2">
+          <a:blip r:embed="rId3">
             <a:extLst>
               <a:ext uri="{28A0092B-C50C-407E-A947-70E740481C1C}">
                 <a14:useLocalDpi xmlns:a14="http://schemas.microsoft.com/office/drawing/2010/main" val="0"/>
@@ -9629,43 +11704,27 @@
                 <a:ea typeface="MS Mincho" charset="-128"/>
                 <a:cs typeface="MS Mincho" charset="-128"/>
               </a:rPr>
-              <a:t>を</a:t>
-            </a:r>
+              <a:t>を描く</a:t>
+            </a:r>
+            <a:endParaRPr lang="en-US" altLang="ja-JP" smtClean="0">
+              <a:latin typeface="MS Mincho" charset="-128"/>
+              <a:ea typeface="MS Mincho" charset="-128"/>
+              <a:cs typeface="MS Mincho" charset="-128"/>
+            </a:endParaRPr>
+          </a:p>
+          <a:p>
+            <a:pPr>
+              <a:lnSpc>
+                <a:spcPct val="150000"/>
+              </a:lnSpc>
+            </a:pPr>
             <a:r>
               <a:rPr lang="ja-JP" altLang="en-US" smtClean="0">
                 <a:latin typeface="MS Mincho" charset="-128"/>
                 <a:ea typeface="MS Mincho" charset="-128"/>
                 <a:cs typeface="MS Mincho" charset="-128"/>
               </a:rPr>
-              <a:t>描く</a:t>
-            </a:r>
-            <a:endParaRPr lang="en-US" altLang="ja-JP" smtClean="0">
-              <a:latin typeface="MS Mincho" charset="-128"/>
-              <a:ea typeface="MS Mincho" charset="-128"/>
-              <a:cs typeface="MS Mincho" charset="-128"/>
-            </a:endParaRPr>
-          </a:p>
-          <a:p>
-            <a:pPr>
-              <a:lnSpc>
-                <a:spcPct val="150000"/>
-              </a:lnSpc>
-            </a:pPr>
-            <a:r>
-              <a:rPr lang="ja-JP" altLang="en-US" smtClean="0">
-                <a:latin typeface="MS Mincho" charset="-128"/>
-                <a:ea typeface="MS Mincho" charset="-128"/>
-                <a:cs typeface="MS Mincho" charset="-128"/>
-              </a:rPr>
-              <a:t>・</a:t>
-            </a:r>
-            <a:r>
-              <a:rPr lang="ja-JP" altLang="en-US" smtClean="0">
-                <a:latin typeface="MS Mincho" charset="-128"/>
-                <a:ea typeface="MS Mincho" charset="-128"/>
-                <a:cs typeface="MS Mincho" charset="-128"/>
-              </a:rPr>
-              <a:t>初期条件は検出したシャトル軌道より与える</a:t>
+              <a:t>・初期条件は検出したシャトル軌道より与える</a:t>
             </a:r>
             <a:endParaRPr lang="en-US" altLang="ja-JP" dirty="0" smtClean="0">
               <a:latin typeface="MS Mincho" charset="-128"/>
@@ -10598,8 +12657,8 @@
           </a:p>
         </p:txBody>
       </p:sp>
-      <mc:AlternateContent xmlns:mc="http://schemas.openxmlformats.org/markup-compatibility/2006">
-        <mc:Choice xmlns:a14="http://schemas.microsoft.com/office/drawing/2010/main" Requires="a14">
+      <mc:AlternateContent xmlns:mc="http://schemas.openxmlformats.org/markup-compatibility/2006" xmlns:a14="http://schemas.microsoft.com/office/drawing/2010/main">
+        <mc:Choice Requires="a14">
           <p:sp>
             <p:nvSpPr>
               <p:cNvPr id="7" name="TextBox 6"/>
@@ -10622,6 +12681,7 @@
               </a:bodyPr>
               <a:lstStyle/>
               <a:p>
+                <a:pPr/>
                 <a14:m>
                   <m:oMathPara xmlns:m="http://schemas.openxmlformats.org/officeDocument/2006/math">
                     <m:oMathParaPr>
@@ -10714,7 +12774,7 @@
             </p:txBody>
           </p:sp>
         </mc:Choice>
-        <mc:Fallback>
+        <mc:Fallback xmlns="">
           <p:sp>
             <p:nvSpPr>
               <p:cNvPr id="7" name="TextBox 6"/>
@@ -10753,8 +12813,8 @@
           </p:sp>
         </mc:Fallback>
       </mc:AlternateContent>
-      <mc:AlternateContent xmlns:mc="http://schemas.openxmlformats.org/markup-compatibility/2006">
-        <mc:Choice xmlns:a14="http://schemas.microsoft.com/office/drawing/2010/main" Requires="a14">
+      <mc:AlternateContent xmlns:mc="http://schemas.openxmlformats.org/markup-compatibility/2006" xmlns:a14="http://schemas.microsoft.com/office/drawing/2010/main">
+        <mc:Choice Requires="a14">
           <p:sp>
             <p:nvSpPr>
               <p:cNvPr id="8" name="TextBox 7"/>
@@ -10777,6 +12837,7 @@
               </a:bodyPr>
               <a:lstStyle/>
               <a:p>
+                <a:pPr/>
                 <a14:m>
                   <m:oMathPara xmlns:m="http://schemas.openxmlformats.org/officeDocument/2006/math">
                     <m:oMathParaPr>
@@ -10885,7 +12946,7 @@
             </p:txBody>
           </p:sp>
         </mc:Choice>
-        <mc:Fallback>
+        <mc:Fallback xmlns="">
           <p:sp>
             <p:nvSpPr>
               <p:cNvPr id="8" name="TextBox 7"/>
@@ -10924,8 +12985,8 @@
           </p:sp>
         </mc:Fallback>
       </mc:AlternateContent>
-      <mc:AlternateContent xmlns:mc="http://schemas.openxmlformats.org/markup-compatibility/2006">
-        <mc:Choice xmlns:a14="http://schemas.microsoft.com/office/drawing/2010/main" Requires="a14">
+      <mc:AlternateContent xmlns:mc="http://schemas.openxmlformats.org/markup-compatibility/2006" xmlns:a14="http://schemas.microsoft.com/office/drawing/2010/main">
+        <mc:Choice Requires="a14">
           <p:sp>
             <p:nvSpPr>
               <p:cNvPr id="9" name="TextBox 8"/>
@@ -10948,6 +13009,7 @@
               </a:bodyPr>
               <a:lstStyle/>
               <a:p>
+                <a:pPr/>
                 <a14:m>
                   <m:oMathPara xmlns:m="http://schemas.openxmlformats.org/officeDocument/2006/math">
                     <m:oMathParaPr>
@@ -11080,7 +13142,7 @@
             </p:txBody>
           </p:sp>
         </mc:Choice>
-        <mc:Fallback>
+        <mc:Fallback xmlns="">
           <p:sp>
             <p:nvSpPr>
               <p:cNvPr id="9" name="TextBox 8"/>
@@ -11119,8 +13181,8 @@
           </p:sp>
         </mc:Fallback>
       </mc:AlternateContent>
-      <mc:AlternateContent xmlns:mc="http://schemas.openxmlformats.org/markup-compatibility/2006">
-        <mc:Choice xmlns:a14="http://schemas.microsoft.com/office/drawing/2010/main" Requires="a14">
+      <mc:AlternateContent xmlns:mc="http://schemas.openxmlformats.org/markup-compatibility/2006" xmlns:a14="http://schemas.microsoft.com/office/drawing/2010/main">
+        <mc:Choice Requires="a14">
           <p:sp>
             <p:nvSpPr>
               <p:cNvPr id="10" name="TextBox 9"/>
@@ -11143,6 +13205,7 @@
               </a:bodyPr>
               <a:lstStyle/>
               <a:p>
+                <a:pPr/>
                 <a14:m>
                   <m:oMathPara xmlns:m="http://schemas.openxmlformats.org/officeDocument/2006/math">
                     <m:oMathParaPr>
@@ -11291,7 +13354,7 @@
             </p:txBody>
           </p:sp>
         </mc:Choice>
-        <mc:Fallback>
+        <mc:Fallback xmlns="">
           <p:sp>
             <p:nvSpPr>
               <p:cNvPr id="10" name="TextBox 9"/>
@@ -11384,7 +13447,7 @@
         </p:nvSpPr>
         <p:spPr>
           <a:xfrm rot="7705760">
-            <a:off x="11549534" y="3206627"/>
+            <a:off x="11576021" y="3278478"/>
             <a:ext cx="228530" cy="432981"/>
           </a:xfrm>
           <a:prstGeom prst="ellipse">
@@ -11430,8 +13493,8 @@
         </p:nvSpPr>
         <p:spPr>
           <a:xfrm rot="3717235">
-            <a:off x="10335564" y="2828348"/>
-            <a:ext cx="249836" cy="628091"/>
+            <a:off x="10026064" y="2740847"/>
+            <a:ext cx="363526" cy="1096424"/>
           </a:xfrm>
           <a:prstGeom prst="ellipse">
             <a:avLst/>
@@ -11468,8 +13531,8 @@
           </a:p>
         </p:txBody>
       </p:sp>
-      <mc:AlternateContent xmlns:mc="http://schemas.openxmlformats.org/markup-compatibility/2006">
-        <mc:Choice xmlns:a14="http://schemas.microsoft.com/office/drawing/2010/main" Requires="a14">
+      <mc:AlternateContent xmlns:mc="http://schemas.openxmlformats.org/markup-compatibility/2006" xmlns:a14="http://schemas.microsoft.com/office/drawing/2010/main">
+        <mc:Choice Requires="a14">
           <p:sp>
             <p:nvSpPr>
               <p:cNvPr id="14" name="Rectangle 13"/>
@@ -11479,7 +13542,7 @@
             <p:spPr>
               <a:xfrm>
                 <a:off x="4523103" y="5053602"/>
-                <a:ext cx="1098477" cy="369332"/>
+                <a:ext cx="1247675" cy="369332"/>
               </a:xfrm>
               <a:prstGeom prst="rect">
                 <a:avLst/>
@@ -11491,6 +13554,7 @@
               </a:bodyPr>
               <a:lstStyle/>
               <a:p>
+                <a:pPr/>
                 <a14:m>
                   <m:oMathPara xmlns:m="http://schemas.openxmlformats.org/officeDocument/2006/math">
                     <m:oMathParaPr>
@@ -11521,7 +13585,7 @@
             </p:txBody>
           </p:sp>
         </mc:Choice>
-        <mc:Fallback>
+        <mc:Fallback xmlns="">
           <p:sp>
             <p:nvSpPr>
               <p:cNvPr id="14" name="Rectangle 13"/>
@@ -11533,7 +13597,7 @@
             <p:spPr>
               <a:xfrm>
                 <a:off x="4523103" y="5053602"/>
-                <a:ext cx="1098477" cy="369332"/>
+                <a:ext cx="1247675" cy="369332"/>
               </a:xfrm>
               <a:prstGeom prst="rect">
                 <a:avLst/>
@@ -11560,8 +13624,8 @@
           </p:sp>
         </mc:Fallback>
       </mc:AlternateContent>
-      <mc:AlternateContent xmlns:mc="http://schemas.openxmlformats.org/markup-compatibility/2006">
-        <mc:Choice xmlns:a14="http://schemas.microsoft.com/office/drawing/2010/main" Requires="a14">
+      <mc:AlternateContent xmlns:mc="http://schemas.openxmlformats.org/markup-compatibility/2006" xmlns:a14="http://schemas.microsoft.com/office/drawing/2010/main">
+        <mc:Choice Requires="a14">
           <p:sp>
             <p:nvSpPr>
               <p:cNvPr id="15" name="Rectangle 14"/>
@@ -11583,6 +13647,7 @@
               </a:bodyPr>
               <a:lstStyle/>
               <a:p>
+                <a:pPr/>
                 <a14:m>
                   <m:oMathPara xmlns:m="http://schemas.openxmlformats.org/officeDocument/2006/math">
                     <m:oMathParaPr>
@@ -11613,7 +13678,7 @@
             </p:txBody>
           </p:sp>
         </mc:Choice>
-        <mc:Fallback>
+        <mc:Fallback xmlns="">
           <p:sp>
             <p:nvSpPr>
               <p:cNvPr id="15" name="Rectangle 14"/>
@@ -11697,8 +13762,8 @@
         </p:nvCxnSpPr>
         <p:spPr>
           <a:xfrm flipV="1">
-            <a:off x="5072342" y="4546242"/>
-            <a:ext cx="549238" cy="507360"/>
+            <a:off x="5146941" y="4546242"/>
+            <a:ext cx="474639" cy="507360"/>
           </a:xfrm>
           <a:prstGeom prst="line">
             <a:avLst/>
@@ -11724,8 +13789,8 @@
           </a:fontRef>
         </p:style>
       </p:cxnSp>
-      <mc:AlternateContent xmlns:mc="http://schemas.openxmlformats.org/markup-compatibility/2006">
-        <mc:Choice xmlns:a14="http://schemas.microsoft.com/office/drawing/2010/main" Requires="a14">
+      <mc:AlternateContent xmlns:mc="http://schemas.openxmlformats.org/markup-compatibility/2006" xmlns:a14="http://schemas.microsoft.com/office/drawing/2010/main">
+        <mc:Choice Requires="a14">
           <p:sp>
             <p:nvSpPr>
               <p:cNvPr id="25" name="Rectangle 24"/>
@@ -11747,6 +13812,7 @@
               </a:bodyPr>
               <a:lstStyle/>
               <a:p>
+                <a:pPr/>
                 <a14:m>
                   <m:oMathPara xmlns:m="http://schemas.openxmlformats.org/officeDocument/2006/math">
                     <m:oMathParaPr>
@@ -11777,7 +13843,7 @@
             </p:txBody>
           </p:sp>
         </mc:Choice>
-        <mc:Fallback>
+        <mc:Fallback xmlns="">
           <p:sp>
             <p:nvSpPr>
               <p:cNvPr id="25" name="Rectangle 24"/>
@@ -11816,8 +13882,8 @@
           </p:sp>
         </mc:Fallback>
       </mc:AlternateContent>
-      <mc:AlternateContent xmlns:mc="http://schemas.openxmlformats.org/markup-compatibility/2006">
-        <mc:Choice xmlns:a14="http://schemas.microsoft.com/office/drawing/2010/main" Requires="a14">
+      <mc:AlternateContent xmlns:mc="http://schemas.openxmlformats.org/markup-compatibility/2006" xmlns:a14="http://schemas.microsoft.com/office/drawing/2010/main">
+        <mc:Choice Requires="a14">
           <p:sp>
             <p:nvSpPr>
               <p:cNvPr id="26" name="Rectangle 25"/>
@@ -11826,8 +13892,8 @@
             </p:nvSpPr>
             <p:spPr>
               <a:xfrm>
-                <a:off x="10094686" y="4868936"/>
-                <a:ext cx="1354985" cy="369332"/>
+                <a:off x="9616450" y="5081241"/>
+                <a:ext cx="1105776" cy="369332"/>
               </a:xfrm>
               <a:prstGeom prst="rect">
                 <a:avLst/>
@@ -11839,6 +13905,7 @@
               </a:bodyPr>
               <a:lstStyle/>
               <a:p>
+                <a:pPr/>
                 <a14:m>
                   <m:oMathPara xmlns:m="http://schemas.openxmlformats.org/officeDocument/2006/math">
                     <m:oMathParaPr>
@@ -11869,7 +13936,7 @@
             </p:txBody>
           </p:sp>
         </mc:Choice>
-        <mc:Fallback>
+        <mc:Fallback xmlns="">
           <p:sp>
             <p:nvSpPr>
               <p:cNvPr id="26" name="Rectangle 25"/>
@@ -11880,8 +13947,8 @@
             </p:nvSpPr>
             <p:spPr>
               <a:xfrm>
-                <a:off x="10094686" y="4868936"/>
-                <a:ext cx="1354985" cy="369332"/>
+                <a:off x="9616450" y="5081241"/>
+                <a:ext cx="1105776" cy="369332"/>
               </a:xfrm>
               <a:prstGeom prst="rect">
                 <a:avLst/>
@@ -11911,15 +13978,13 @@
       <p:cxnSp>
         <p:nvCxnSpPr>
           <p:cNvPr id="27" name="Straight Connector 26"/>
-          <p:cNvCxnSpPr>
-            <a:stCxn id="26" idx="0"/>
-          </p:cNvCxnSpPr>
+          <p:cNvCxnSpPr/>
           <p:nvPr/>
         </p:nvCxnSpPr>
         <p:spPr>
           <a:xfrm flipV="1">
-            <a:off x="10772179" y="4327301"/>
-            <a:ext cx="496835" cy="541635"/>
+            <a:off x="10722226" y="5110888"/>
+            <a:ext cx="609820" cy="155019"/>
           </a:xfrm>
           <a:prstGeom prst="line">
             <a:avLst/>
@@ -11982,8 +14047,8 @@
           </a:fontRef>
         </p:style>
       </p:cxnSp>
-      <mc:AlternateContent xmlns:mc="http://schemas.openxmlformats.org/markup-compatibility/2006">
-        <mc:Choice xmlns:a14="http://schemas.microsoft.com/office/drawing/2010/main" Requires="a14">
+      <mc:AlternateContent xmlns:mc="http://schemas.openxmlformats.org/markup-compatibility/2006" xmlns:a14="http://schemas.microsoft.com/office/drawing/2010/main">
+        <mc:Choice Requires="a14">
           <p:sp>
             <p:nvSpPr>
               <p:cNvPr id="41" name="Rectangle 40"/>
@@ -12016,7 +14081,9 @@
                       <m:t>𝛾</m:t>
                     </m:r>
                     <m:r>
-                      <a:rPr lang="en-US"/>
+                      <a:rPr lang="en-US">
+                        <a:latin typeface="Cambria Math" charset="0"/>
+                      </a:rPr>
                       <m:t>∶</m:t>
                     </m:r>
                   </m:oMath>
@@ -12050,7 +14117,7 @@
             </p:txBody>
           </p:sp>
         </mc:Choice>
-        <mc:Fallback>
+        <mc:Fallback xmlns="">
           <p:sp>
             <p:nvSpPr>
               <p:cNvPr id="41" name="Rectangle 40"/>
@@ -12089,8 +14156,8 @@
           </p:sp>
         </mc:Fallback>
       </mc:AlternateContent>
-      <mc:AlternateContent xmlns:mc="http://schemas.openxmlformats.org/markup-compatibility/2006">
-        <mc:Choice xmlns:a14="http://schemas.microsoft.com/office/drawing/2010/main" Requires="a14">
+      <mc:AlternateContent xmlns:mc="http://schemas.openxmlformats.org/markup-compatibility/2006" xmlns:a14="http://schemas.microsoft.com/office/drawing/2010/main">
+        <mc:Choice Requires="a14">
           <p:sp>
             <p:nvSpPr>
               <p:cNvPr id="42" name="Rectangle 41"/>
@@ -12123,7 +14190,9 @@
                       <m:t>𝐶</m:t>
                     </m:r>
                     <m:r>
-                      <a:rPr lang="en-US"/>
+                      <a:rPr lang="en-US">
+                        <a:latin typeface="Cambria Math" charset="0"/>
+                      </a:rPr>
                       <m:t>∶</m:t>
                     </m:r>
                   </m:oMath>
@@ -12146,15 +14215,7 @@
                     <a:ea typeface="MS Mincho" charset="-128"/>
                     <a:cs typeface="MS Mincho" charset="-128"/>
                   </a:rPr>
-                  <a:t> </a:t>
-                </a:r>
-                <a:r>
-                  <a:rPr lang="en-US" altLang="ja-JP" smtClean="0">
-                    <a:latin typeface="MS Mincho" charset="-128"/>
-                    <a:ea typeface="MS Mincho" charset="-128"/>
-                    <a:cs typeface="MS Mincho" charset="-128"/>
-                  </a:rPr>
-                  <a:t>(</a:t>
+                  <a:t> (</a:t>
                 </a:r>
                 <a:r>
                   <a:rPr lang="en-US" smtClean="0">
@@ -12181,7 +14242,7 @@
             </p:txBody>
           </p:sp>
         </mc:Choice>
-        <mc:Fallback>
+        <mc:Fallback xmlns="">
           <p:sp>
             <p:nvSpPr>
               <p:cNvPr id="42" name="Rectangle 41"/>
@@ -12220,8 +14281,8 @@
           </p:sp>
         </mc:Fallback>
       </mc:AlternateContent>
-      <mc:AlternateContent xmlns:mc="http://schemas.openxmlformats.org/markup-compatibility/2006">
-        <mc:Choice xmlns:a14="http://schemas.microsoft.com/office/drawing/2010/main" Requires="a14">
+      <mc:AlternateContent xmlns:mc="http://schemas.openxmlformats.org/markup-compatibility/2006" xmlns:a14="http://schemas.microsoft.com/office/drawing/2010/main">
+        <mc:Choice Requires="a14">
           <p:sp>
             <p:nvSpPr>
               <p:cNvPr id="43" name="Rectangle 42"/>
@@ -12230,8 +14291,8 @@
             </p:nvSpPr>
             <p:spPr>
               <a:xfrm>
-                <a:off x="6413471" y="4397751"/>
-                <a:ext cx="1944768" cy="369332"/>
+                <a:off x="6413470" y="4397751"/>
+                <a:ext cx="2691794" cy="369332"/>
               </a:xfrm>
               <a:prstGeom prst="rect">
                 <a:avLst/>
@@ -12273,7 +14334,7 @@
                     <a:ea typeface="MS Mincho" charset="-128"/>
                     <a:cs typeface="MS Mincho" charset="-128"/>
                   </a:rPr>
-                  <a:t>空気密度</a:t>
+                  <a:t>空気の密度</a:t>
                 </a:r>
                 <a:endParaRPr lang="en-US">
                   <a:latin typeface="MS Mincho" charset="-128"/>
@@ -12284,7 +14345,7 @@
             </p:txBody>
           </p:sp>
         </mc:Choice>
-        <mc:Fallback>
+        <mc:Fallback xmlns="">
           <p:sp>
             <p:nvSpPr>
               <p:cNvPr id="43" name="Rectangle 42"/>
@@ -12295,8 +14356,8 @@
             </p:nvSpPr>
             <p:spPr>
               <a:xfrm>
-                <a:off x="6413471" y="4397751"/>
-                <a:ext cx="1944768" cy="369332"/>
+                <a:off x="6413470" y="4397751"/>
+                <a:ext cx="2691794" cy="369332"/>
               </a:xfrm>
               <a:prstGeom prst="rect">
                 <a:avLst/>
@@ -12323,8 +14384,8 @@
           </p:sp>
         </mc:Fallback>
       </mc:AlternateContent>
-      <mc:AlternateContent xmlns:mc="http://schemas.openxmlformats.org/markup-compatibility/2006">
-        <mc:Choice xmlns:a14="http://schemas.microsoft.com/office/drawing/2010/main" Requires="a14">
+      <mc:AlternateContent xmlns:mc="http://schemas.openxmlformats.org/markup-compatibility/2006" xmlns:a14="http://schemas.microsoft.com/office/drawing/2010/main">
+        <mc:Choice Requires="a14">
           <p:sp>
             <p:nvSpPr>
               <p:cNvPr id="44" name="Rectangle 43"/>
@@ -12334,7 +14395,7 @@
             <p:spPr>
               <a:xfrm>
                 <a:off x="6421245" y="4741555"/>
-                <a:ext cx="2364809" cy="369332"/>
+                <a:ext cx="2544738" cy="369332"/>
               </a:xfrm>
               <a:prstGeom prst="rect">
                 <a:avLst/>
@@ -12387,7 +14448,7 @@
             </p:txBody>
           </p:sp>
         </mc:Choice>
-        <mc:Fallback>
+        <mc:Fallback xmlns="">
           <p:sp>
             <p:nvSpPr>
               <p:cNvPr id="44" name="Rectangle 43"/>
@@ -12399,7 +14460,7 @@
             <p:spPr>
               <a:xfrm>
                 <a:off x="6421245" y="4741555"/>
-                <a:ext cx="2364809" cy="369332"/>
+                <a:ext cx="2544738" cy="369332"/>
               </a:xfrm>
               <a:prstGeom prst="rect">
                 <a:avLst/>
@@ -12407,7 +14468,7 @@
               <a:blipFill rotWithShape="0">
                 <a:blip r:embed="rId15"/>
                 <a:stretch>
-                  <a:fillRect t="-15000" r="-1289" b="-21667"/>
+                  <a:fillRect t="-15000" b="-21667"/>
                 </a:stretch>
               </a:blipFill>
             </p:spPr>
@@ -12426,6 +14487,286 @@
           </p:sp>
         </mc:Fallback>
       </mc:AlternateContent>
+      <mc:AlternateContent xmlns:mc="http://schemas.openxmlformats.org/markup-compatibility/2006" xmlns:a14="http://schemas.microsoft.com/office/drawing/2010/main">
+        <mc:Choice Requires="a14">
+          <p:sp>
+            <p:nvSpPr>
+              <p:cNvPr id="28" name="Rectangle 27"/>
+              <p:cNvSpPr/>
+              <p:nvPr/>
+            </p:nvSpPr>
+            <p:spPr>
+              <a:xfrm>
+                <a:off x="9701257" y="4345138"/>
+                <a:ext cx="1354985" cy="369332"/>
+              </a:xfrm>
+              <a:prstGeom prst="rect">
+                <a:avLst/>
+              </a:prstGeom>
+              <a:ln>
+                <a:solidFill>
+                  <a:srgbClr val="FF0000"/>
+                </a:solidFill>
+              </a:ln>
+            </p:spPr>
+            <p:txBody>
+              <a:bodyPr wrap="square">
+                <a:spAutoFit/>
+              </a:bodyPr>
+              <a:lstStyle/>
+              <a:p>
+                <a:pPr/>
+                <a14:m>
+                  <m:oMathPara xmlns:m="http://schemas.openxmlformats.org/officeDocument/2006/math">
+                    <m:oMathParaPr>
+                      <m:jc m:val="centerGroup"/>
+                    </m:oMathParaPr>
+                    <m:oMath xmlns:m="http://schemas.openxmlformats.org/officeDocument/2006/math">
+                      <m:r>
+                        <a:rPr lang="en-US" b="0" i="1" smtClean="0">
+                          <a:latin typeface="Cambria Math" charset="0"/>
+                          <a:ea typeface="Cambria Math" charset="0"/>
+                          <a:cs typeface="Cambria Math" charset="0"/>
+                        </a:rPr>
+                        <m:t>𝐶</m:t>
+                      </m:r>
+                      <m:r>
+                        <a:rPr lang="en-US" b="0" i="1" smtClean="0">
+                          <a:latin typeface="Cambria Math" charset="0"/>
+                          <a:ea typeface="Cambria Math" charset="0"/>
+                          <a:cs typeface="Cambria Math" charset="0"/>
+                        </a:rPr>
+                        <m:t>=0.3</m:t>
+                      </m:r>
+                    </m:oMath>
+                  </m:oMathPara>
+                </a14:m>
+                <a:endParaRPr lang="en-US"/>
+              </a:p>
+            </p:txBody>
+          </p:sp>
+        </mc:Choice>
+        <mc:Fallback xmlns="">
+          <p:sp>
+            <p:nvSpPr>
+              <p:cNvPr id="28" name="Rectangle 27"/>
+              <p:cNvSpPr>
+                <a:spLocks noRot="1" noChangeAspect="1" noMove="1" noResize="1" noEditPoints="1" noAdjustHandles="1" noChangeArrowheads="1" noChangeShapeType="1" noTextEdit="1"/>
+              </p:cNvSpPr>
+              <p:nvPr/>
+            </p:nvSpPr>
+            <p:spPr>
+              <a:xfrm>
+                <a:off x="9701257" y="4345138"/>
+                <a:ext cx="1354985" cy="369332"/>
+              </a:xfrm>
+              <a:prstGeom prst="rect">
+                <a:avLst/>
+              </a:prstGeom>
+              <a:blipFill rotWithShape="0">
+                <a:blip r:embed="rId16"/>
+                <a:stretch>
+                  <a:fillRect/>
+                </a:stretch>
+              </a:blipFill>
+              <a:ln>
+                <a:solidFill>
+                  <a:srgbClr val="FF0000"/>
+                </a:solidFill>
+              </a:ln>
+            </p:spPr>
+            <p:txBody>
+              <a:bodyPr/>
+              <a:lstStyle/>
+              <a:p>
+                <a:r>
+                  <a:rPr lang="en-US">
+                    <a:noFill/>
+                  </a:rPr>
+                  <a:t> </a:t>
+                </a:r>
+              </a:p>
+            </p:txBody>
+          </p:sp>
+        </mc:Fallback>
+      </mc:AlternateContent>
+      <p:cxnSp>
+        <p:nvCxnSpPr>
+          <p:cNvPr id="29" name="Straight Connector 28"/>
+          <p:cNvCxnSpPr>
+            <a:stCxn id="28" idx="3"/>
+          </p:cNvCxnSpPr>
+          <p:nvPr/>
+        </p:nvCxnSpPr>
+        <p:spPr>
+          <a:xfrm flipV="1">
+            <a:off x="11056242" y="4109586"/>
+            <a:ext cx="896604" cy="420218"/>
+          </a:xfrm>
+          <a:prstGeom prst="line">
+            <a:avLst/>
+          </a:prstGeom>
+          <a:ln>
+            <a:solidFill>
+              <a:schemeClr val="tx1"/>
+            </a:solidFill>
+          </a:ln>
+        </p:spPr>
+        <p:style>
+          <a:lnRef idx="1">
+            <a:schemeClr val="accent1"/>
+          </a:lnRef>
+          <a:fillRef idx="0">
+            <a:schemeClr val="accent1"/>
+          </a:fillRef>
+          <a:effectRef idx="0">
+            <a:schemeClr val="accent1"/>
+          </a:effectRef>
+          <a:fontRef idx="minor">
+            <a:schemeClr val="tx1"/>
+          </a:fontRef>
+        </p:style>
+      </p:cxnSp>
+      <mc:AlternateContent xmlns:mc="http://schemas.openxmlformats.org/markup-compatibility/2006" xmlns:a14="http://schemas.microsoft.com/office/drawing/2010/main">
+        <mc:Choice Requires="a14">
+          <p:sp>
+            <p:nvSpPr>
+              <p:cNvPr id="34" name="Rectangle 33"/>
+              <p:cNvSpPr/>
+              <p:nvPr/>
+            </p:nvSpPr>
+            <p:spPr>
+              <a:xfrm>
+                <a:off x="3662948" y="4221378"/>
+                <a:ext cx="1354985" cy="369332"/>
+              </a:xfrm>
+              <a:prstGeom prst="rect">
+                <a:avLst/>
+              </a:prstGeom>
+              <a:ln>
+                <a:solidFill>
+                  <a:srgbClr val="FF0000"/>
+                </a:solidFill>
+              </a:ln>
+            </p:spPr>
+            <p:txBody>
+              <a:bodyPr wrap="square">
+                <a:spAutoFit/>
+              </a:bodyPr>
+              <a:lstStyle/>
+              <a:p>
+                <a:pPr/>
+                <a14:m>
+                  <m:oMathPara xmlns:m="http://schemas.openxmlformats.org/officeDocument/2006/math">
+                    <m:oMathParaPr>
+                      <m:jc m:val="centerGroup"/>
+                    </m:oMathParaPr>
+                    <m:oMath xmlns:m="http://schemas.openxmlformats.org/officeDocument/2006/math">
+                      <m:r>
+                        <a:rPr lang="en-US" b="0" i="1" smtClean="0">
+                          <a:latin typeface="Cambria Math" charset="0"/>
+                          <a:ea typeface="Cambria Math" charset="0"/>
+                          <a:cs typeface="Cambria Math" charset="0"/>
+                        </a:rPr>
+                        <m:t>𝛾</m:t>
+                      </m:r>
+                      <m:r>
+                        <a:rPr lang="en-US" b="0" i="1" smtClean="0">
+                          <a:latin typeface="Cambria Math" charset="0"/>
+                          <a:ea typeface="Cambria Math" charset="0"/>
+                          <a:cs typeface="Cambria Math" charset="0"/>
+                        </a:rPr>
+                        <m:t>=0.007</m:t>
+                      </m:r>
+                    </m:oMath>
+                  </m:oMathPara>
+                </a14:m>
+                <a:endParaRPr lang="en-US"/>
+              </a:p>
+            </p:txBody>
+          </p:sp>
+        </mc:Choice>
+        <mc:Fallback xmlns="">
+          <p:sp>
+            <p:nvSpPr>
+              <p:cNvPr id="34" name="Rectangle 33"/>
+              <p:cNvSpPr>
+                <a:spLocks noRot="1" noChangeAspect="1" noMove="1" noResize="1" noEditPoints="1" noAdjustHandles="1" noChangeArrowheads="1" noChangeShapeType="1" noTextEdit="1"/>
+              </p:cNvSpPr>
+              <p:nvPr/>
+            </p:nvSpPr>
+            <p:spPr>
+              <a:xfrm>
+                <a:off x="3662948" y="4221378"/>
+                <a:ext cx="1354985" cy="369332"/>
+              </a:xfrm>
+              <a:prstGeom prst="rect">
+                <a:avLst/>
+              </a:prstGeom>
+              <a:blipFill rotWithShape="0">
+                <a:blip r:embed="rId17"/>
+                <a:stretch>
+                  <a:fillRect b="-1587"/>
+                </a:stretch>
+              </a:blipFill>
+              <a:ln>
+                <a:solidFill>
+                  <a:srgbClr val="FF0000"/>
+                </a:solidFill>
+              </a:ln>
+            </p:spPr>
+            <p:txBody>
+              <a:bodyPr/>
+              <a:lstStyle/>
+              <a:p>
+                <a:r>
+                  <a:rPr lang="en-US">
+                    <a:noFill/>
+                  </a:rPr>
+                  <a:t> </a:t>
+                </a:r>
+              </a:p>
+            </p:txBody>
+          </p:sp>
+        </mc:Fallback>
+      </mc:AlternateContent>
+      <p:cxnSp>
+        <p:nvCxnSpPr>
+          <p:cNvPr id="35" name="Straight Connector 34"/>
+          <p:cNvCxnSpPr>
+            <a:stCxn id="34" idx="3"/>
+          </p:cNvCxnSpPr>
+          <p:nvPr/>
+        </p:nvCxnSpPr>
+        <p:spPr>
+          <a:xfrm flipV="1">
+            <a:off x="5017933" y="4060134"/>
+            <a:ext cx="924615" cy="345910"/>
+          </a:xfrm>
+          <a:prstGeom prst="line">
+            <a:avLst/>
+          </a:prstGeom>
+          <a:ln>
+            <a:solidFill>
+              <a:schemeClr val="tx1"/>
+            </a:solidFill>
+          </a:ln>
+        </p:spPr>
+        <p:style>
+          <a:lnRef idx="1">
+            <a:schemeClr val="accent1"/>
+          </a:lnRef>
+          <a:fillRef idx="0">
+            <a:schemeClr val="accent1"/>
+          </a:fillRef>
+          <a:effectRef idx="0">
+            <a:schemeClr val="accent1"/>
+          </a:effectRef>
+          <a:fontRef idx="minor">
+            <a:schemeClr val="tx1"/>
+          </a:fontRef>
+        </p:style>
+      </p:cxnSp>
     </p:spTree>
     <p:extLst>
       <p:ext uri="{BB962C8B-B14F-4D97-AF65-F5344CB8AC3E}">
@@ -12563,31 +14904,7 @@
                 <a:ea typeface="MS Mincho" charset="-128"/>
                 <a:cs typeface="MS Mincho" charset="-128"/>
               </a:rPr>
-              <a:t>・</a:t>
-            </a:r>
-            <a:r>
-              <a:rPr lang="ja-JP" altLang="en-US" smtClean="0">
-                <a:latin typeface="MS Mincho" charset="-128"/>
-                <a:ea typeface="MS Mincho" charset="-128"/>
-                <a:cs typeface="MS Mincho" charset="-128"/>
-              </a:rPr>
-              <a:t>回転</a:t>
-            </a:r>
-            <a:r>
-              <a:rPr lang="ja-JP" altLang="en-US" smtClean="0">
-                <a:latin typeface="MS Mincho" charset="-128"/>
-                <a:ea typeface="MS Mincho" charset="-128"/>
-                <a:cs typeface="MS Mincho" charset="-128"/>
-              </a:rPr>
-              <a:t>の</a:t>
-            </a:r>
-            <a:r>
-              <a:rPr lang="ja-JP" altLang="en-US" smtClean="0">
-                <a:latin typeface="MS Mincho" charset="-128"/>
-                <a:ea typeface="MS Mincho" charset="-128"/>
-                <a:cs typeface="MS Mincho" charset="-128"/>
-              </a:rPr>
-              <a:t>運動</a:t>
+              <a:t>・回転の運動</a:t>
             </a:r>
             <a:r>
               <a:rPr lang="ja-JP" altLang="en-US" dirty="0" smtClean="0">
@@ -12603,15 +14920,7 @@
                 <a:ea typeface="MS Mincho" charset="-128"/>
                 <a:cs typeface="MS Mincho" charset="-128"/>
               </a:rPr>
-              <a:t>を</a:t>
-            </a:r>
-            <a:r>
-              <a:rPr lang="ja-JP" altLang="en-US" smtClean="0">
-                <a:latin typeface="MS Mincho" charset="-128"/>
-                <a:ea typeface="MS Mincho" charset="-128"/>
-                <a:cs typeface="MS Mincho" charset="-128"/>
-              </a:rPr>
-              <a:t>解き、</a:t>
+              <a:t>を解き、</a:t>
             </a:r>
             <a:endParaRPr lang="en-US" altLang="ja-JP" smtClean="0">
               <a:latin typeface="MS Mincho" charset="-128"/>
@@ -12885,7 +15194,7 @@
         </p:nvSpPr>
         <p:spPr>
           <a:xfrm>
-            <a:off x="9497497" y="2270212"/>
+            <a:off x="10513025" y="2709003"/>
             <a:ext cx="760144" cy="369332"/>
           </a:xfrm>
           <a:prstGeom prst="rect">
@@ -12930,8 +15239,8 @@
           <p:nvPr/>
         </p:nvSpPr>
         <p:spPr>
-          <a:xfrm rot="19545031">
-            <a:off x="9729791" y="2599592"/>
+          <a:xfrm rot="21217532">
+            <a:off x="10026708" y="2763569"/>
             <a:ext cx="472763" cy="430530"/>
           </a:xfrm>
           <a:prstGeom prst="rightArrow">
@@ -13266,8 +15575,8 @@
           </a:p>
         </p:txBody>
       </p:sp>
-      <mc:AlternateContent xmlns:mc="http://schemas.openxmlformats.org/markup-compatibility/2006">
-        <mc:Choice xmlns:a14="http://schemas.microsoft.com/office/drawing/2010/main" Requires="a14">
+      <mc:AlternateContent xmlns:mc="http://schemas.openxmlformats.org/markup-compatibility/2006" xmlns:a14="http://schemas.microsoft.com/office/drawing/2010/main">
+        <mc:Choice Requires="a14">
           <p:sp>
             <p:nvSpPr>
               <p:cNvPr id="19" name="Rectangle 18"/>
@@ -13276,7 +15585,7 @@
             </p:nvSpPr>
             <p:spPr>
               <a:xfrm>
-                <a:off x="6811045" y="3746145"/>
+                <a:off x="7351981" y="2817898"/>
                 <a:ext cx="1532007" cy="369332"/>
               </a:xfrm>
               <a:prstGeom prst="rect">
@@ -13289,6 +15598,7 @@
               </a:bodyPr>
               <a:lstStyle/>
               <a:p>
+                <a:pPr/>
                 <a14:m>
                   <m:oMathPara xmlns:m="http://schemas.openxmlformats.org/officeDocument/2006/math">
                     <m:oMathParaPr>
@@ -13412,7 +15722,7 @@
             </p:txBody>
           </p:sp>
         </mc:Choice>
-        <mc:Fallback>
+        <mc:Fallback xmlns="">
           <p:sp>
             <p:nvSpPr>
               <p:cNvPr id="19" name="Rectangle 18"/>
@@ -13423,7 +15733,7 @@
             </p:nvSpPr>
             <p:spPr>
               <a:xfrm>
-                <a:off x="6811045" y="3746145"/>
+                <a:off x="7351981" y="2817898"/>
                 <a:ext cx="1532007" cy="369332"/>
               </a:xfrm>
               <a:prstGeom prst="rect">
@@ -13432,7 +15742,7 @@
               <a:blipFill rotWithShape="0">
                 <a:blip r:embed="rId2"/>
                 <a:stretch>
-                  <a:fillRect b="-13333"/>
+                  <a:fillRect b="-13115"/>
                 </a:stretch>
               </a:blipFill>
             </p:spPr>
@@ -13451,8 +15761,8 @@
           </p:sp>
         </mc:Fallback>
       </mc:AlternateContent>
-      <mc:AlternateContent xmlns:mc="http://schemas.openxmlformats.org/markup-compatibility/2006">
-        <mc:Choice xmlns:a14="http://schemas.microsoft.com/office/drawing/2010/main" Requires="a14">
+      <mc:AlternateContent xmlns:mc="http://schemas.openxmlformats.org/markup-compatibility/2006" xmlns:a14="http://schemas.microsoft.com/office/drawing/2010/main">
+        <mc:Choice Requires="a14">
           <p:sp>
             <p:nvSpPr>
               <p:cNvPr id="20" name="Rectangle 19"/>
@@ -13461,7 +15771,7 @@
             </p:nvSpPr>
             <p:spPr>
               <a:xfrm>
-                <a:off x="7331497" y="2839191"/>
+                <a:off x="6765802" y="3713641"/>
                 <a:ext cx="1590512" cy="394210"/>
               </a:xfrm>
               <a:prstGeom prst="rect">
@@ -13474,6 +15784,7 @@
               </a:bodyPr>
               <a:lstStyle/>
               <a:p>
+                <a:pPr/>
                 <a14:m>
                   <m:oMathPara xmlns:m="http://schemas.openxmlformats.org/officeDocument/2006/math">
                     <m:oMathParaPr>
@@ -13613,7 +15924,7 @@
             </p:txBody>
           </p:sp>
         </mc:Choice>
-        <mc:Fallback>
+        <mc:Fallback xmlns="">
           <p:sp>
             <p:nvSpPr>
               <p:cNvPr id="20" name="Rectangle 19"/>
@@ -13624,7 +15935,7 @@
             </p:nvSpPr>
             <p:spPr>
               <a:xfrm>
-                <a:off x="7331497" y="2839191"/>
+                <a:off x="6765802" y="3713641"/>
                 <a:ext cx="1590512" cy="394210"/>
               </a:xfrm>
               <a:prstGeom prst="rect">
@@ -13633,7 +15944,7 @@
               <a:blipFill rotWithShape="0">
                 <a:blip r:embed="rId3"/>
                 <a:stretch>
-                  <a:fillRect b="-7813"/>
+                  <a:fillRect b="-7692"/>
                 </a:stretch>
               </a:blipFill>
             </p:spPr>
@@ -13722,8 +16033,8 @@
           </a:fontRef>
         </p:style>
       </p:cxnSp>
-      <mc:AlternateContent xmlns:mc="http://schemas.openxmlformats.org/markup-compatibility/2006">
-        <mc:Choice xmlns:a14="http://schemas.microsoft.com/office/drawing/2010/main" Requires="a14">
+      <mc:AlternateContent xmlns:mc="http://schemas.openxmlformats.org/markup-compatibility/2006" xmlns:a14="http://schemas.microsoft.com/office/drawing/2010/main">
+        <mc:Choice Requires="a14">
           <p:sp>
             <p:nvSpPr>
               <p:cNvPr id="41" name="Rectangle 40"/>
@@ -13732,7 +16043,7 @@
             </p:nvSpPr>
             <p:spPr>
               <a:xfrm>
-                <a:off x="10111571" y="4521267"/>
+                <a:off x="10452271" y="2150998"/>
                 <a:ext cx="1641796" cy="369332"/>
               </a:xfrm>
               <a:prstGeom prst="rect">
@@ -13745,6 +16056,7 @@
               </a:bodyPr>
               <a:lstStyle/>
               <a:p>
+                <a:pPr/>
                 <a14:m>
                   <m:oMathPara xmlns:m="http://schemas.openxmlformats.org/officeDocument/2006/math">
                     <m:oMathParaPr>
@@ -13791,7 +16103,7 @@
             </p:txBody>
           </p:sp>
         </mc:Choice>
-        <mc:Fallback>
+        <mc:Fallback xmlns="">
           <p:sp>
             <p:nvSpPr>
               <p:cNvPr id="41" name="Rectangle 40"/>
@@ -13802,7 +16114,7 @@
             </p:nvSpPr>
             <p:spPr>
               <a:xfrm>
-                <a:off x="10111571" y="4521267"/>
+                <a:off x="10452271" y="2150998"/>
                 <a:ext cx="1641796" cy="369332"/>
               </a:xfrm>
               <a:prstGeom prst="rect">
@@ -13830,8 +16142,8 @@
           </p:sp>
         </mc:Fallback>
       </mc:AlternateContent>
-      <mc:AlternateContent xmlns:mc="http://schemas.openxmlformats.org/markup-compatibility/2006">
-        <mc:Choice xmlns:a14="http://schemas.microsoft.com/office/drawing/2010/main" Requires="a14">
+      <mc:AlternateContent xmlns:mc="http://schemas.openxmlformats.org/markup-compatibility/2006" xmlns:a14="http://schemas.microsoft.com/office/drawing/2010/main">
+        <mc:Choice Requires="a14">
           <p:sp>
             <p:nvSpPr>
               <p:cNvPr id="42" name="Rectangle 41"/>
@@ -13840,7 +16152,7 @@
             </p:nvSpPr>
             <p:spPr>
               <a:xfrm>
-                <a:off x="10432644" y="2369814"/>
+                <a:off x="10099405" y="4481530"/>
                 <a:ext cx="1569660" cy="369332"/>
               </a:xfrm>
               <a:prstGeom prst="rect">
@@ -13853,6 +16165,7 @@
               </a:bodyPr>
               <a:lstStyle/>
               <a:p>
+                <a:pPr/>
                 <a14:m>
                   <m:oMathPara xmlns:m="http://schemas.openxmlformats.org/officeDocument/2006/math">
                     <m:oMathParaPr>
@@ -13899,7 +16212,7 @@
             </p:txBody>
           </p:sp>
         </mc:Choice>
-        <mc:Fallback>
+        <mc:Fallback xmlns="">
           <p:sp>
             <p:nvSpPr>
               <p:cNvPr id="42" name="Rectangle 41"/>
@@ -13910,7 +16223,7 @@
             </p:nvSpPr>
             <p:spPr>
               <a:xfrm>
-                <a:off x="10432644" y="2369814"/>
+                <a:off x="10099405" y="4481530"/>
                 <a:ext cx="1569660" cy="369332"/>
               </a:xfrm>
               <a:prstGeom prst="rect">
@@ -13919,7 +16232,7 @@
               <a:blipFill rotWithShape="0">
                 <a:blip r:embed="rId5"/>
                 <a:stretch>
-                  <a:fillRect b="-13333"/>
+                  <a:fillRect b="-13115"/>
                 </a:stretch>
               </a:blipFill>
             </p:spPr>

</xml_diff>